<commit_message>
Issue -5: Logistic Regression
Material related to Logistic Regression is added and changes updated in Linear Regression
</commit_message>
<xml_diff>
--- a/1_Linear_Regression/Linear_Regression.pptx
+++ b/1_Linear_Regression/Linear_Regression.pptx
@@ -13,6 +13,13 @@
     <p:sldId id="263" r:id="rId7"/>
     <p:sldId id="264" r:id="rId8"/>
     <p:sldId id="265" r:id="rId9"/>
+    <p:sldId id="266" r:id="rId10"/>
+    <p:sldId id="267" r:id="rId11"/>
+    <p:sldId id="268" r:id="rId12"/>
+    <p:sldId id="269" r:id="rId13"/>
+    <p:sldId id="270" r:id="rId14"/>
+    <p:sldId id="271" r:id="rId15"/>
+    <p:sldId id="272" r:id="rId16"/>
   </p:sldIdLst>
   <p:sldSz cx="12192000" cy="6858000"/>
   <p:notesSz cx="6858000" cy="9144000"/>
@@ -13308,9 +13315,1040 @@
 </p:sld>
 </file>
 
+<file path=ppt/slides/slide10.xml><?xml version="1.0" encoding="utf-8"?>
+<p:sld xmlns:a="http://schemas.openxmlformats.org/drawingml/2006/main" xmlns:r="http://schemas.openxmlformats.org/officeDocument/2006/relationships" xmlns:p="http://schemas.openxmlformats.org/presentationml/2006/main">
+  <p:cSld>
+    <p:spTree>
+      <p:nvGrpSpPr>
+        <p:cNvPr id="1" name="">
+          <a:extLst>
+            <a:ext uri="{FF2B5EF4-FFF2-40B4-BE49-F238E27FC236}">
+              <a16:creationId xmlns:a16="http://schemas.microsoft.com/office/drawing/2014/main" id="{7677903A-E6B5-9F6A-5BD0-B94805974965}"/>
+            </a:ext>
+          </a:extLst>
+        </p:cNvPr>
+        <p:cNvGrpSpPr/>
+        <p:nvPr/>
+      </p:nvGrpSpPr>
+      <p:grpSpPr>
+        <a:xfrm>
+          <a:off x="0" y="0"/>
+          <a:ext cx="0" cy="0"/>
+          <a:chOff x="0" y="0"/>
+          <a:chExt cx="0" cy="0"/>
+        </a:xfrm>
+      </p:grpSpPr>
+      <p:sp>
+        <p:nvSpPr>
+          <p:cNvPr id="3" name="TextBox 2">
+            <a:extLst>
+              <a:ext uri="{FF2B5EF4-FFF2-40B4-BE49-F238E27FC236}">
+                <a16:creationId xmlns:a16="http://schemas.microsoft.com/office/drawing/2014/main" id="{88A725FA-3BC2-7702-CA75-BBD25FFA5F3A}"/>
+              </a:ext>
+            </a:extLst>
+          </p:cNvPr>
+          <p:cNvSpPr txBox="1"/>
+          <p:nvPr/>
+        </p:nvSpPr>
+        <p:spPr>
+          <a:xfrm>
+            <a:off x="624201" y="864163"/>
+            <a:ext cx="9521806" cy="5129674"/>
+          </a:xfrm>
+          <a:prstGeom prst="rect">
+            <a:avLst/>
+          </a:prstGeom>
+          <a:noFill/>
+        </p:spPr>
+        <p:txBody>
+          <a:bodyPr wrap="square" rtlCol="0">
+            <a:spAutoFit/>
+          </a:bodyPr>
+          <a:lstStyle/>
+          <a:p>
+            <a:r>
+              <a:rPr lang="en-IN" b="1" dirty="0"/>
+              <a:t>When to use:</a:t>
+            </a:r>
+          </a:p>
+          <a:p>
+            <a:endParaRPr lang="en-IN" b="1" dirty="0"/>
+          </a:p>
+          <a:p>
+            <a:pPr marL="285750" indent="-285750">
+              <a:lnSpc>
+                <a:spcPct val="150000"/>
+              </a:lnSpc>
+              <a:buFont typeface="Arial" panose="020B0604020202020204" pitchFamily="34" charset="0"/>
+              <a:buChar char="•"/>
+            </a:pPr>
+            <a:r>
+              <a:rPr lang="en-IN" sz="1400" dirty="0"/>
+              <a:t>Sales forecasting</a:t>
+            </a:r>
+          </a:p>
+          <a:p>
+            <a:pPr marL="285750" indent="-285750">
+              <a:lnSpc>
+                <a:spcPct val="150000"/>
+              </a:lnSpc>
+              <a:buFont typeface="Arial" panose="020B0604020202020204" pitchFamily="34" charset="0"/>
+              <a:buChar char="•"/>
+            </a:pPr>
+            <a:endParaRPr lang="en-IN" sz="1400" dirty="0"/>
+          </a:p>
+          <a:p>
+            <a:pPr marL="285750" indent="-285750">
+              <a:lnSpc>
+                <a:spcPct val="150000"/>
+              </a:lnSpc>
+              <a:buFont typeface="Arial" panose="020B0604020202020204" pitchFamily="34" charset="0"/>
+              <a:buChar char="•"/>
+            </a:pPr>
+            <a:r>
+              <a:rPr lang="en-IN" sz="1400" dirty="0"/>
+              <a:t>Predicting optimum product prices</a:t>
+            </a:r>
+          </a:p>
+          <a:p>
+            <a:pPr marL="285750" indent="-285750">
+              <a:lnSpc>
+                <a:spcPct val="150000"/>
+              </a:lnSpc>
+              <a:buFont typeface="Arial" panose="020B0604020202020204" pitchFamily="34" charset="0"/>
+              <a:buChar char="•"/>
+            </a:pPr>
+            <a:endParaRPr lang="en-IN" sz="1400" dirty="0"/>
+          </a:p>
+          <a:p>
+            <a:pPr marL="285750" indent="-285750">
+              <a:lnSpc>
+                <a:spcPct val="150000"/>
+              </a:lnSpc>
+              <a:buFont typeface="Arial" panose="020B0604020202020204" pitchFamily="34" charset="0"/>
+              <a:buChar char="•"/>
+            </a:pPr>
+            <a:r>
+              <a:rPr lang="en-IN" sz="1400" dirty="0"/>
+              <a:t>Quantifying the causal relationship between event and response</a:t>
+            </a:r>
+          </a:p>
+          <a:p>
+            <a:pPr marL="742950" lvl="1" indent="-285750">
+              <a:lnSpc>
+                <a:spcPct val="150000"/>
+              </a:lnSpc>
+              <a:buFont typeface="Wingdings" panose="05000000000000000000" pitchFamily="2" charset="2"/>
+              <a:buChar char="§"/>
+            </a:pPr>
+            <a:r>
+              <a:rPr lang="en-IN" sz="1400" dirty="0"/>
+              <a:t>Clinical drug trails</a:t>
+            </a:r>
+          </a:p>
+          <a:p>
+            <a:pPr marL="742950" lvl="1" indent="-285750">
+              <a:lnSpc>
+                <a:spcPct val="150000"/>
+              </a:lnSpc>
+              <a:buFont typeface="Wingdings" panose="05000000000000000000" pitchFamily="2" charset="2"/>
+              <a:buChar char="§"/>
+            </a:pPr>
+            <a:r>
+              <a:rPr lang="en-IN" sz="1400" dirty="0"/>
+              <a:t>Engineering safety tests</a:t>
+            </a:r>
+          </a:p>
+          <a:p>
+            <a:pPr marL="742950" lvl="1" indent="-285750">
+              <a:lnSpc>
+                <a:spcPct val="150000"/>
+              </a:lnSpc>
+              <a:buFont typeface="Wingdings" panose="05000000000000000000" pitchFamily="2" charset="2"/>
+              <a:buChar char="§"/>
+            </a:pPr>
+            <a:r>
+              <a:rPr lang="en-IN" sz="1400" dirty="0"/>
+              <a:t>Marketing research</a:t>
+            </a:r>
+          </a:p>
+          <a:p>
+            <a:pPr marL="285750" indent="-285750">
+              <a:lnSpc>
+                <a:spcPct val="150000"/>
+              </a:lnSpc>
+              <a:buFont typeface="Arial" panose="020B0604020202020204" pitchFamily="34" charset="0"/>
+              <a:buChar char="•"/>
+            </a:pPr>
+            <a:endParaRPr lang="en-IN" sz="1400" dirty="0"/>
+          </a:p>
+          <a:p>
+            <a:pPr marL="285750" indent="-285750">
+              <a:lnSpc>
+                <a:spcPct val="150000"/>
+              </a:lnSpc>
+              <a:buFont typeface="Arial" panose="020B0604020202020204" pitchFamily="34" charset="0"/>
+              <a:buChar char="•"/>
+            </a:pPr>
+            <a:r>
+              <a:rPr lang="en-IN" sz="1400" dirty="0"/>
+              <a:t>Identifying patterns to forecast future behaviour </a:t>
+            </a:r>
+          </a:p>
+          <a:p>
+            <a:pPr marL="742950" lvl="1" indent="-285750">
+              <a:lnSpc>
+                <a:spcPct val="150000"/>
+              </a:lnSpc>
+              <a:buFont typeface="Wingdings" panose="05000000000000000000" pitchFamily="2" charset="2"/>
+              <a:buChar char="§"/>
+            </a:pPr>
+            <a:r>
+              <a:rPr lang="en-IN" sz="1400" dirty="0"/>
+              <a:t>predicting insurance claims</a:t>
+            </a:r>
+          </a:p>
+          <a:p>
+            <a:pPr marL="742950" lvl="1" indent="-285750">
+              <a:lnSpc>
+                <a:spcPct val="150000"/>
+              </a:lnSpc>
+              <a:buFont typeface="Wingdings" panose="05000000000000000000" pitchFamily="2" charset="2"/>
+              <a:buChar char="§"/>
+            </a:pPr>
+            <a:r>
+              <a:rPr lang="en-IN" sz="1400" dirty="0"/>
+              <a:t>natural disaster damage</a:t>
+            </a:r>
+          </a:p>
+          <a:p>
+            <a:pPr marL="742950" lvl="1" indent="-285750">
+              <a:lnSpc>
+                <a:spcPct val="150000"/>
+              </a:lnSpc>
+              <a:buFont typeface="Wingdings" panose="05000000000000000000" pitchFamily="2" charset="2"/>
+              <a:buChar char="§"/>
+            </a:pPr>
+            <a:r>
+              <a:rPr lang="en-IN" sz="1400" dirty="0"/>
+              <a:t>Election results</a:t>
+            </a:r>
+          </a:p>
+          <a:p>
+            <a:pPr marL="742950" lvl="1" indent="-285750">
+              <a:lnSpc>
+                <a:spcPct val="150000"/>
+              </a:lnSpc>
+              <a:buFont typeface="Wingdings" panose="05000000000000000000" pitchFamily="2" charset="2"/>
+              <a:buChar char="§"/>
+            </a:pPr>
+            <a:r>
+              <a:rPr lang="en-IN" sz="1400" dirty="0"/>
+              <a:t>Crime rates</a:t>
+            </a:r>
+          </a:p>
+        </p:txBody>
+      </p:sp>
+    </p:spTree>
+    <p:extLst>
+      <p:ext uri="{BB962C8B-B14F-4D97-AF65-F5344CB8AC3E}">
+        <p14:creationId xmlns:p14="http://schemas.microsoft.com/office/powerpoint/2010/main" val="3099146258"/>
+      </p:ext>
+    </p:extLst>
+  </p:cSld>
+  <p:clrMapOvr>
+    <a:masterClrMapping/>
+  </p:clrMapOvr>
+</p:sld>
+</file>
+
+<file path=ppt/slides/slide11.xml><?xml version="1.0" encoding="utf-8"?>
+<p:sld xmlns:a="http://schemas.openxmlformats.org/drawingml/2006/main" xmlns:r="http://schemas.openxmlformats.org/officeDocument/2006/relationships" xmlns:p="http://schemas.openxmlformats.org/presentationml/2006/main">
+  <p:cSld>
+    <p:spTree>
+      <p:nvGrpSpPr>
+        <p:cNvPr id="1" name="">
+          <a:extLst>
+            <a:ext uri="{FF2B5EF4-FFF2-40B4-BE49-F238E27FC236}">
+              <a16:creationId xmlns:a16="http://schemas.microsoft.com/office/drawing/2014/main" id="{E1903994-678E-68F4-C326-A9C0AD555326}"/>
+            </a:ext>
+          </a:extLst>
+        </p:cNvPr>
+        <p:cNvGrpSpPr/>
+        <p:nvPr/>
+      </p:nvGrpSpPr>
+      <p:grpSpPr>
+        <a:xfrm>
+          <a:off x="0" y="0"/>
+          <a:ext cx="0" cy="0"/>
+          <a:chOff x="0" y="0"/>
+          <a:chExt cx="0" cy="0"/>
+        </a:xfrm>
+      </p:grpSpPr>
+      <p:sp>
+        <p:nvSpPr>
+          <p:cNvPr id="2" name="Title 1">
+            <a:extLst>
+              <a:ext uri="{FF2B5EF4-FFF2-40B4-BE49-F238E27FC236}">
+                <a16:creationId xmlns:a16="http://schemas.microsoft.com/office/drawing/2014/main" id="{AC95FFEA-C61E-4588-7A85-63B952738326}"/>
+              </a:ext>
+            </a:extLst>
+          </p:cNvPr>
+          <p:cNvSpPr>
+            <a:spLocks noGrp="1"/>
+          </p:cNvSpPr>
+          <p:nvPr>
+            <p:ph type="ctrTitle"/>
+          </p:nvPr>
+        </p:nvSpPr>
+        <p:spPr/>
+        <p:txBody>
+          <a:bodyPr/>
+          <a:lstStyle/>
+          <a:p>
+            <a:r>
+              <a:rPr lang="en-IN" dirty="0"/>
+              <a:t>Weakness</a:t>
+            </a:r>
+            <a:endParaRPr lang="en-DE" dirty="0"/>
+          </a:p>
+        </p:txBody>
+      </p:sp>
+    </p:spTree>
+    <p:extLst>
+      <p:ext uri="{BB962C8B-B14F-4D97-AF65-F5344CB8AC3E}">
+        <p14:creationId xmlns:p14="http://schemas.microsoft.com/office/powerpoint/2010/main" val="1497788785"/>
+      </p:ext>
+    </p:extLst>
+  </p:cSld>
+  <p:clrMapOvr>
+    <a:masterClrMapping/>
+  </p:clrMapOvr>
+</p:sld>
+</file>
+
+<file path=ppt/slides/slide12.xml><?xml version="1.0" encoding="utf-8"?>
+<p:sld xmlns:a="http://schemas.openxmlformats.org/drawingml/2006/main" xmlns:r="http://schemas.openxmlformats.org/officeDocument/2006/relationships" xmlns:p="http://schemas.openxmlformats.org/presentationml/2006/main">
+  <p:cSld>
+    <p:spTree>
+      <p:nvGrpSpPr>
+        <p:cNvPr id="1" name="">
+          <a:extLst>
+            <a:ext uri="{FF2B5EF4-FFF2-40B4-BE49-F238E27FC236}">
+              <a16:creationId xmlns:a16="http://schemas.microsoft.com/office/drawing/2014/main" id="{92583031-A76C-E8F5-B6EB-14A7B97FFD34}"/>
+            </a:ext>
+          </a:extLst>
+        </p:cNvPr>
+        <p:cNvGrpSpPr/>
+        <p:nvPr/>
+      </p:nvGrpSpPr>
+      <p:grpSpPr>
+        <a:xfrm>
+          <a:off x="0" y="0"/>
+          <a:ext cx="0" cy="0"/>
+          <a:chOff x="0" y="0"/>
+          <a:chExt cx="0" cy="0"/>
+        </a:xfrm>
+      </p:grpSpPr>
+      <p:sp>
+        <p:nvSpPr>
+          <p:cNvPr id="3" name="TextBox 2">
+            <a:extLst>
+              <a:ext uri="{FF2B5EF4-FFF2-40B4-BE49-F238E27FC236}">
+                <a16:creationId xmlns:a16="http://schemas.microsoft.com/office/drawing/2014/main" id="{798EBECA-0001-C443-C6E6-8868F1A8C795}"/>
+              </a:ext>
+            </a:extLst>
+          </p:cNvPr>
+          <p:cNvSpPr txBox="1"/>
+          <p:nvPr/>
+        </p:nvSpPr>
+        <p:spPr>
+          <a:xfrm>
+            <a:off x="624201" y="864163"/>
+            <a:ext cx="9521806" cy="2867516"/>
+          </a:xfrm>
+          <a:prstGeom prst="rect">
+            <a:avLst/>
+          </a:prstGeom>
+          <a:noFill/>
+        </p:spPr>
+        <p:txBody>
+          <a:bodyPr wrap="square" rtlCol="0">
+            <a:spAutoFit/>
+          </a:bodyPr>
+          <a:lstStyle/>
+          <a:p>
+            <a:r>
+              <a:rPr lang="en-IN" b="1" dirty="0"/>
+              <a:t>Limitations:</a:t>
+            </a:r>
+          </a:p>
+          <a:p>
+            <a:endParaRPr lang="en-IN" b="1" dirty="0"/>
+          </a:p>
+          <a:p>
+            <a:pPr marL="285750" indent="-285750">
+              <a:lnSpc>
+                <a:spcPct val="150000"/>
+              </a:lnSpc>
+              <a:buFont typeface="Arial" panose="020B0604020202020204" pitchFamily="34" charset="0"/>
+              <a:buChar char="•"/>
+            </a:pPr>
+            <a:r>
+              <a:rPr lang="en-IN" sz="1400" dirty="0"/>
+              <a:t>Only works with numerical features</a:t>
+            </a:r>
+          </a:p>
+          <a:p>
+            <a:pPr marL="285750" indent="-285750">
+              <a:lnSpc>
+                <a:spcPct val="150000"/>
+              </a:lnSpc>
+              <a:buFont typeface="Arial" panose="020B0604020202020204" pitchFamily="34" charset="0"/>
+              <a:buChar char="•"/>
+            </a:pPr>
+            <a:endParaRPr lang="en-IN" sz="1400" dirty="0"/>
+          </a:p>
+          <a:p>
+            <a:pPr marL="285750" indent="-285750">
+              <a:lnSpc>
+                <a:spcPct val="150000"/>
+              </a:lnSpc>
+              <a:buFont typeface="Arial" panose="020B0604020202020204" pitchFamily="34" charset="0"/>
+              <a:buChar char="•"/>
+            </a:pPr>
+            <a:r>
+              <a:rPr lang="en-IN" sz="1400" dirty="0"/>
+              <a:t>Categorical data needs to be pre-processed</a:t>
+            </a:r>
+          </a:p>
+          <a:p>
+            <a:pPr marL="285750" indent="-285750">
+              <a:lnSpc>
+                <a:spcPct val="150000"/>
+              </a:lnSpc>
+              <a:buFont typeface="Arial" panose="020B0604020202020204" pitchFamily="34" charset="0"/>
+              <a:buChar char="•"/>
+            </a:pPr>
+            <a:endParaRPr lang="en-IN" sz="1400" dirty="0"/>
+          </a:p>
+          <a:p>
+            <a:pPr marL="285750" indent="-285750">
+              <a:lnSpc>
+                <a:spcPct val="150000"/>
+              </a:lnSpc>
+              <a:buFont typeface="Arial" panose="020B0604020202020204" pitchFamily="34" charset="0"/>
+              <a:buChar char="•"/>
+            </a:pPr>
+            <a:r>
+              <a:rPr lang="en-IN" sz="1400" dirty="0"/>
+              <a:t>Doesn’t cope up well with the missing data</a:t>
+            </a:r>
+          </a:p>
+          <a:p>
+            <a:pPr marL="285750" indent="-285750">
+              <a:lnSpc>
+                <a:spcPct val="150000"/>
+              </a:lnSpc>
+              <a:buFont typeface="Arial" panose="020B0604020202020204" pitchFamily="34" charset="0"/>
+              <a:buChar char="•"/>
+            </a:pPr>
+            <a:endParaRPr lang="en-IN" sz="1400" dirty="0"/>
+          </a:p>
+          <a:p>
+            <a:pPr marL="285750" indent="-285750">
+              <a:lnSpc>
+                <a:spcPct val="150000"/>
+              </a:lnSpc>
+              <a:buFont typeface="Arial" panose="020B0604020202020204" pitchFamily="34" charset="0"/>
+              <a:buChar char="•"/>
+            </a:pPr>
+            <a:r>
+              <a:rPr lang="en-IN" sz="1400" dirty="0"/>
+              <a:t>It makes assumptions about the data</a:t>
+            </a:r>
+          </a:p>
+        </p:txBody>
+      </p:sp>
+    </p:spTree>
+    <p:extLst>
+      <p:ext uri="{BB962C8B-B14F-4D97-AF65-F5344CB8AC3E}">
+        <p14:creationId xmlns:p14="http://schemas.microsoft.com/office/powerpoint/2010/main" val="2701782910"/>
+      </p:ext>
+    </p:extLst>
+  </p:cSld>
+  <p:clrMapOvr>
+    <a:masterClrMapping/>
+  </p:clrMapOvr>
+</p:sld>
+</file>
+
+<file path=ppt/slides/slide13.xml><?xml version="1.0" encoding="utf-8"?>
+<p:sld xmlns:a="http://schemas.openxmlformats.org/drawingml/2006/main" xmlns:r="http://schemas.openxmlformats.org/officeDocument/2006/relationships" xmlns:p="http://schemas.openxmlformats.org/presentationml/2006/main">
+  <p:cSld>
+    <p:spTree>
+      <p:nvGrpSpPr>
+        <p:cNvPr id="1" name="">
+          <a:extLst>
+            <a:ext uri="{FF2B5EF4-FFF2-40B4-BE49-F238E27FC236}">
+              <a16:creationId xmlns:a16="http://schemas.microsoft.com/office/drawing/2014/main" id="{A381247F-1062-E6D6-82C8-BA6A72022C60}"/>
+            </a:ext>
+          </a:extLst>
+        </p:cNvPr>
+        <p:cNvGrpSpPr/>
+        <p:nvPr/>
+      </p:nvGrpSpPr>
+      <p:grpSpPr>
+        <a:xfrm>
+          <a:off x="0" y="0"/>
+          <a:ext cx="0" cy="0"/>
+          <a:chOff x="0" y="0"/>
+          <a:chExt cx="0" cy="0"/>
+        </a:xfrm>
+      </p:grpSpPr>
+      <p:sp>
+        <p:nvSpPr>
+          <p:cNvPr id="2" name="Title 1">
+            <a:extLst>
+              <a:ext uri="{FF2B5EF4-FFF2-40B4-BE49-F238E27FC236}">
+                <a16:creationId xmlns:a16="http://schemas.microsoft.com/office/drawing/2014/main" id="{19968F35-38D1-C017-5AE3-8002D0B2D8E4}"/>
+              </a:ext>
+            </a:extLst>
+          </p:cNvPr>
+          <p:cNvSpPr>
+            <a:spLocks noGrp="1"/>
+          </p:cNvSpPr>
+          <p:nvPr>
+            <p:ph type="ctrTitle"/>
+          </p:nvPr>
+        </p:nvSpPr>
+        <p:spPr/>
+        <p:txBody>
+          <a:bodyPr/>
+          <a:lstStyle/>
+          <a:p>
+            <a:pPr>
+              <a:lnSpc>
+                <a:spcPct val="150000"/>
+              </a:lnSpc>
+            </a:pPr>
+            <a:r>
+              <a:rPr lang="en-IN" dirty="0"/>
+              <a:t>Optimization and Other formats</a:t>
+            </a:r>
+            <a:endParaRPr lang="en-DE" dirty="0"/>
+          </a:p>
+        </p:txBody>
+      </p:sp>
+    </p:spTree>
+    <p:extLst>
+      <p:ext uri="{BB962C8B-B14F-4D97-AF65-F5344CB8AC3E}">
+        <p14:creationId xmlns:p14="http://schemas.microsoft.com/office/powerpoint/2010/main" val="2026446879"/>
+      </p:ext>
+    </p:extLst>
+  </p:cSld>
+  <p:clrMapOvr>
+    <a:masterClrMapping/>
+  </p:clrMapOvr>
+</p:sld>
+</file>
+
+<file path=ppt/slides/slide14.xml><?xml version="1.0" encoding="utf-8"?>
+<p:sld xmlns:a="http://schemas.openxmlformats.org/drawingml/2006/main" xmlns:r="http://schemas.openxmlformats.org/officeDocument/2006/relationships" xmlns:p="http://schemas.openxmlformats.org/presentationml/2006/main">
+  <p:cSld>
+    <p:spTree>
+      <p:nvGrpSpPr>
+        <p:cNvPr id="1" name="">
+          <a:extLst>
+            <a:ext uri="{FF2B5EF4-FFF2-40B4-BE49-F238E27FC236}">
+              <a16:creationId xmlns:a16="http://schemas.microsoft.com/office/drawing/2014/main" id="{5F62930D-E77C-33AB-2297-0FAFD0AEC55B}"/>
+            </a:ext>
+          </a:extLst>
+        </p:cNvPr>
+        <p:cNvGrpSpPr/>
+        <p:nvPr/>
+      </p:nvGrpSpPr>
+      <p:grpSpPr>
+        <a:xfrm>
+          <a:off x="0" y="0"/>
+          <a:ext cx="0" cy="0"/>
+          <a:chOff x="0" y="0"/>
+          <a:chExt cx="0" cy="0"/>
+        </a:xfrm>
+      </p:grpSpPr>
+      <p:sp>
+        <p:nvSpPr>
+          <p:cNvPr id="3" name="TextBox 2">
+            <a:extLst>
+              <a:ext uri="{FF2B5EF4-FFF2-40B4-BE49-F238E27FC236}">
+                <a16:creationId xmlns:a16="http://schemas.microsoft.com/office/drawing/2014/main" id="{8B2721E4-B55B-8283-EAEC-DB00919E4713}"/>
+              </a:ext>
+            </a:extLst>
+          </p:cNvPr>
+          <p:cNvSpPr txBox="1"/>
+          <p:nvPr/>
+        </p:nvSpPr>
+        <p:spPr>
+          <a:xfrm>
+            <a:off x="607725" y="540997"/>
+            <a:ext cx="9521806" cy="5776005"/>
+          </a:xfrm>
+          <a:prstGeom prst="rect">
+            <a:avLst/>
+          </a:prstGeom>
+          <a:noFill/>
+        </p:spPr>
+        <p:txBody>
+          <a:bodyPr wrap="square" rtlCol="0">
+            <a:spAutoFit/>
+          </a:bodyPr>
+          <a:lstStyle/>
+          <a:p>
+            <a:r>
+              <a:rPr lang="en-IN" b="1" dirty="0"/>
+              <a:t>Regression tree algorithm:</a:t>
+            </a:r>
+          </a:p>
+          <a:p>
+            <a:endParaRPr lang="en-IN" b="1" dirty="0"/>
+          </a:p>
+          <a:p>
+            <a:pPr marL="285750" indent="-285750">
+              <a:lnSpc>
+                <a:spcPct val="150000"/>
+              </a:lnSpc>
+              <a:buFont typeface="Arial" panose="020B0604020202020204" pitchFamily="34" charset="0"/>
+              <a:buChar char="•"/>
+            </a:pPr>
+            <a:r>
+              <a:rPr lang="en-IN" sz="1400" dirty="0"/>
+              <a:t>Subset of Decision Tree algorithm used in the context of predicting a continuous valued output</a:t>
+            </a:r>
+          </a:p>
+          <a:p>
+            <a:pPr marL="285750" indent="-285750">
+              <a:lnSpc>
+                <a:spcPct val="150000"/>
+              </a:lnSpc>
+              <a:buFont typeface="Arial" panose="020B0604020202020204" pitchFamily="34" charset="0"/>
+              <a:buChar char="•"/>
+            </a:pPr>
+            <a:endParaRPr lang="en-IN" sz="1400" dirty="0"/>
+          </a:p>
+          <a:p>
+            <a:pPr marL="285750" indent="-285750">
+              <a:lnSpc>
+                <a:spcPct val="150000"/>
+              </a:lnSpc>
+              <a:buFont typeface="Arial" panose="020B0604020202020204" pitchFamily="34" charset="0"/>
+              <a:buChar char="•"/>
+            </a:pPr>
+            <a:r>
+              <a:rPr lang="en-IN" sz="1400" dirty="0"/>
+              <a:t>Utilizes measures like Mean Squared Error to minimize the distance between the actual value and the predicted continuous values</a:t>
+            </a:r>
+          </a:p>
+          <a:p>
+            <a:pPr>
+              <a:lnSpc>
+                <a:spcPct val="150000"/>
+              </a:lnSpc>
+            </a:pPr>
+            <a:endParaRPr lang="en-IN" sz="1400" dirty="0"/>
+          </a:p>
+          <a:p>
+            <a:pPr>
+              <a:lnSpc>
+                <a:spcPct val="150000"/>
+              </a:lnSpc>
+            </a:pPr>
+            <a:r>
+              <a:rPr lang="en-IN" sz="1400" b="1" dirty="0"/>
+              <a:t>Instantiation:</a:t>
+            </a:r>
+            <a:endParaRPr lang="en-IN" sz="1400" dirty="0"/>
+          </a:p>
+          <a:p>
+            <a:pPr>
+              <a:lnSpc>
+                <a:spcPct val="150000"/>
+              </a:lnSpc>
+            </a:pPr>
+            <a:r>
+              <a:rPr lang="en-IN" sz="1400" dirty="0"/>
+              <a:t>from </a:t>
+            </a:r>
+            <a:r>
+              <a:rPr lang="en-IN" sz="1400" dirty="0" err="1"/>
+              <a:t>sklearn.tree</a:t>
+            </a:r>
+            <a:r>
+              <a:rPr lang="en-IN" sz="1400" dirty="0"/>
+              <a:t> import DecisionTreeRegressor</a:t>
+            </a:r>
+          </a:p>
+          <a:p>
+            <a:pPr>
+              <a:lnSpc>
+                <a:spcPct val="150000"/>
+              </a:lnSpc>
+            </a:pPr>
+            <a:r>
+              <a:rPr lang="en-IN" sz="1400" dirty="0"/>
+              <a:t>regressor = DecisionTreeRegressor(</a:t>
+            </a:r>
+            <a:r>
+              <a:rPr lang="en-IN" sz="1400" dirty="0" err="1"/>
+              <a:t>max_depth</a:t>
+            </a:r>
+            <a:r>
+              <a:rPr lang="en-IN" sz="1400" dirty="0"/>
+              <a:t> = 3)</a:t>
+            </a:r>
+          </a:p>
+          <a:p>
+            <a:pPr>
+              <a:lnSpc>
+                <a:spcPct val="150000"/>
+              </a:lnSpc>
+            </a:pPr>
+            <a:r>
+              <a:rPr lang="en-IN" sz="1400" dirty="0" err="1"/>
+              <a:t>regressor.fit</a:t>
+            </a:r>
+            <a:r>
+              <a:rPr lang="en-IN" sz="1400" dirty="0"/>
+              <a:t>(</a:t>
+            </a:r>
+            <a:r>
+              <a:rPr lang="en-IN" sz="1400" dirty="0" err="1"/>
+              <a:t>X_train</a:t>
+            </a:r>
+            <a:r>
+              <a:rPr lang="en-IN" sz="1400" dirty="0"/>
+              <a:t>, </a:t>
+            </a:r>
+            <a:r>
+              <a:rPr lang="en-IN" sz="1400" dirty="0" err="1"/>
+              <a:t>y_train</a:t>
+            </a:r>
+            <a:r>
+              <a:rPr lang="en-IN" sz="1400" dirty="0"/>
+              <a:t>)</a:t>
+            </a:r>
+          </a:p>
+          <a:p>
+            <a:pPr>
+              <a:lnSpc>
+                <a:spcPct val="150000"/>
+              </a:lnSpc>
+            </a:pPr>
+            <a:endParaRPr lang="en-IN" sz="1400" dirty="0"/>
+          </a:p>
+          <a:p>
+            <a:pPr>
+              <a:lnSpc>
+                <a:spcPct val="150000"/>
+              </a:lnSpc>
+            </a:pPr>
+            <a:r>
+              <a:rPr lang="en-IN" sz="1400" b="1" dirty="0" err="1"/>
+              <a:t>Predicition</a:t>
+            </a:r>
+            <a:r>
+              <a:rPr lang="en-IN" sz="1400" b="1" dirty="0"/>
+              <a:t> and evaluation:</a:t>
+            </a:r>
+          </a:p>
+          <a:p>
+            <a:pPr>
+              <a:lnSpc>
+                <a:spcPct val="150000"/>
+              </a:lnSpc>
+            </a:pPr>
+            <a:r>
+              <a:rPr lang="en-IN" sz="1400" dirty="0" err="1"/>
+              <a:t>y_pred</a:t>
+            </a:r>
+            <a:r>
+              <a:rPr lang="en-IN" sz="1400" dirty="0"/>
+              <a:t> = </a:t>
+            </a:r>
+            <a:r>
+              <a:rPr lang="en-IN" sz="1400" dirty="0" err="1"/>
+              <a:t>regressor.predict</a:t>
+            </a:r>
+            <a:r>
+              <a:rPr lang="en-IN" sz="1400" dirty="0"/>
+              <a:t>(</a:t>
+            </a:r>
+            <a:r>
+              <a:rPr lang="en-IN" sz="1400" dirty="0" err="1"/>
+              <a:t>X_test</a:t>
+            </a:r>
+            <a:r>
+              <a:rPr lang="en-IN" sz="1400" dirty="0"/>
+              <a:t>)</a:t>
+            </a:r>
+          </a:p>
+          <a:p>
+            <a:pPr>
+              <a:lnSpc>
+                <a:spcPct val="150000"/>
+              </a:lnSpc>
+            </a:pPr>
+            <a:endParaRPr lang="en-IN" sz="1400" dirty="0"/>
+          </a:p>
+          <a:p>
+            <a:pPr>
+              <a:lnSpc>
+                <a:spcPct val="150000"/>
+              </a:lnSpc>
+            </a:pPr>
+            <a:r>
+              <a:rPr lang="en-IN" sz="1400" dirty="0"/>
+              <a:t>from </a:t>
+            </a:r>
+            <a:r>
+              <a:rPr lang="en-IN" sz="1400" dirty="0" err="1"/>
+              <a:t>sklearn.metrics</a:t>
+            </a:r>
+            <a:r>
+              <a:rPr lang="en-IN" sz="1400" dirty="0"/>
+              <a:t> import </a:t>
+            </a:r>
+            <a:r>
+              <a:rPr lang="en-IN" sz="1400" dirty="0" err="1"/>
+              <a:t>mean_squared_error</a:t>
+            </a:r>
+            <a:endParaRPr lang="en-IN" sz="1400" dirty="0"/>
+          </a:p>
+          <a:p>
+            <a:pPr>
+              <a:lnSpc>
+                <a:spcPct val="150000"/>
+              </a:lnSpc>
+            </a:pPr>
+            <a:r>
+              <a:rPr lang="en-IN" sz="1400" dirty="0"/>
+              <a:t>from math import sqrt</a:t>
+            </a:r>
+          </a:p>
+          <a:p>
+            <a:pPr>
+              <a:lnSpc>
+                <a:spcPct val="150000"/>
+              </a:lnSpc>
+            </a:pPr>
+            <a:r>
+              <a:rPr lang="en-IN" sz="1400" dirty="0"/>
+              <a:t>sqrt(</a:t>
+            </a:r>
+            <a:r>
+              <a:rPr lang="en-IN" sz="1400" dirty="0" err="1"/>
+              <a:t>mean_squared_error</a:t>
+            </a:r>
+            <a:r>
+              <a:rPr lang="en-IN" sz="1400" dirty="0"/>
+              <a:t>(</a:t>
+            </a:r>
+            <a:r>
+              <a:rPr lang="en-IN" sz="1400" dirty="0" err="1"/>
+              <a:t>y_test</a:t>
+            </a:r>
+            <a:r>
+              <a:rPr lang="en-IN" sz="1400" dirty="0"/>
+              <a:t>, </a:t>
+            </a:r>
+            <a:r>
+              <a:rPr lang="en-IN" sz="1400" dirty="0" err="1"/>
+              <a:t>y_pred</a:t>
+            </a:r>
+            <a:r>
+              <a:rPr lang="en-IN" sz="1400" dirty="0"/>
+              <a:t>))</a:t>
+            </a:r>
+          </a:p>
+        </p:txBody>
+      </p:sp>
+    </p:spTree>
+    <p:extLst>
+      <p:ext uri="{BB962C8B-B14F-4D97-AF65-F5344CB8AC3E}">
+        <p14:creationId xmlns:p14="http://schemas.microsoft.com/office/powerpoint/2010/main" val="2894946269"/>
+      </p:ext>
+    </p:extLst>
+  </p:cSld>
+  <p:clrMapOvr>
+    <a:masterClrMapping/>
+  </p:clrMapOvr>
+</p:sld>
+</file>
+
+<file path=ppt/slides/slide15.xml><?xml version="1.0" encoding="utf-8"?>
+<p:sld xmlns:a="http://schemas.openxmlformats.org/drawingml/2006/main" xmlns:r="http://schemas.openxmlformats.org/officeDocument/2006/relationships" xmlns:p="http://schemas.openxmlformats.org/presentationml/2006/main">
+  <p:cSld>
+    <p:spTree>
+      <p:nvGrpSpPr>
+        <p:cNvPr id="1" name="">
+          <a:extLst>
+            <a:ext uri="{FF2B5EF4-FFF2-40B4-BE49-F238E27FC236}">
+              <a16:creationId xmlns:a16="http://schemas.microsoft.com/office/drawing/2014/main" id="{469A913A-E819-8B1C-7DA5-08FD8BBD8D54}"/>
+            </a:ext>
+          </a:extLst>
+        </p:cNvPr>
+        <p:cNvGrpSpPr/>
+        <p:nvPr/>
+      </p:nvGrpSpPr>
+      <p:grpSpPr>
+        <a:xfrm>
+          <a:off x="0" y="0"/>
+          <a:ext cx="0" cy="0"/>
+          <a:chOff x="0" y="0"/>
+          <a:chExt cx="0" cy="0"/>
+        </a:xfrm>
+      </p:grpSpPr>
+      <p:sp>
+        <p:nvSpPr>
+          <p:cNvPr id="3" name="TextBox 2">
+            <a:extLst>
+              <a:ext uri="{FF2B5EF4-FFF2-40B4-BE49-F238E27FC236}">
+                <a16:creationId xmlns:a16="http://schemas.microsoft.com/office/drawing/2014/main" id="{0FA0899B-AD3C-D397-00FD-84B5F27A628A}"/>
+              </a:ext>
+            </a:extLst>
+          </p:cNvPr>
+          <p:cNvSpPr txBox="1"/>
+          <p:nvPr/>
+        </p:nvSpPr>
+        <p:spPr>
+          <a:xfrm>
+            <a:off x="583011" y="1331830"/>
+            <a:ext cx="9521806" cy="3837012"/>
+          </a:xfrm>
+          <a:prstGeom prst="rect">
+            <a:avLst/>
+          </a:prstGeom>
+          <a:noFill/>
+        </p:spPr>
+        <p:txBody>
+          <a:bodyPr wrap="square" rtlCol="0">
+            <a:spAutoFit/>
+          </a:bodyPr>
+          <a:lstStyle/>
+          <a:p>
+            <a:r>
+              <a:rPr lang="en-IN" b="1" dirty="0"/>
+              <a:t>Gradient boost regression algorithm:</a:t>
+            </a:r>
+          </a:p>
+          <a:p>
+            <a:endParaRPr lang="en-IN" b="1" dirty="0"/>
+          </a:p>
+          <a:p>
+            <a:pPr marL="285750" indent="-285750">
+              <a:lnSpc>
+                <a:spcPct val="150000"/>
+              </a:lnSpc>
+              <a:buFont typeface="Arial" panose="020B0604020202020204" pitchFamily="34" charset="0"/>
+              <a:buChar char="•"/>
+            </a:pPr>
+            <a:r>
+              <a:rPr lang="en-IN" sz="1400" dirty="0"/>
+              <a:t>Uses ensemble of decision trees to formulate underlying patterns within a dataset</a:t>
+            </a:r>
+          </a:p>
+          <a:p>
+            <a:pPr marL="285750" indent="-285750">
+              <a:lnSpc>
+                <a:spcPct val="150000"/>
+              </a:lnSpc>
+              <a:buFont typeface="Arial" panose="020B0604020202020204" pitchFamily="34" charset="0"/>
+              <a:buChar char="•"/>
+            </a:pPr>
+            <a:endParaRPr lang="en-IN" sz="1400" dirty="0"/>
+          </a:p>
+          <a:p>
+            <a:pPr marL="285750" indent="-285750">
+              <a:lnSpc>
+                <a:spcPct val="150000"/>
+              </a:lnSpc>
+              <a:buFont typeface="Arial" panose="020B0604020202020204" pitchFamily="34" charset="0"/>
+              <a:buChar char="•"/>
+            </a:pPr>
+            <a:r>
+              <a:rPr lang="en-IN" sz="1400" dirty="0"/>
+              <a:t>The core idea is to operate by forming a team of decision trees, where each of the member progressively learns from the mistakes of its predecessors</a:t>
+            </a:r>
+          </a:p>
+          <a:p>
+            <a:pPr>
+              <a:lnSpc>
+                <a:spcPct val="150000"/>
+              </a:lnSpc>
+            </a:pPr>
+            <a:endParaRPr lang="en-IN" sz="1400" dirty="0"/>
+          </a:p>
+          <a:p>
+            <a:pPr marL="285750" indent="-285750">
+              <a:lnSpc>
+                <a:spcPct val="150000"/>
+              </a:lnSpc>
+              <a:buFont typeface="Arial" panose="020B0604020202020204" pitchFamily="34" charset="0"/>
+              <a:buChar char="•"/>
+            </a:pPr>
+            <a:r>
+              <a:rPr lang="en-IN" sz="1400" dirty="0"/>
+              <a:t>In essence, each subsequent decision tree in the sequence attempts to correct the prediction errors made by the tree before it -&gt; leading to an ‘ensemble’ that makes a final prediction based on the collective wisdom of all the individual trees</a:t>
+            </a:r>
+          </a:p>
+          <a:p>
+            <a:pPr marL="285750" indent="-285750">
+              <a:lnSpc>
+                <a:spcPct val="150000"/>
+              </a:lnSpc>
+              <a:buFont typeface="Arial" panose="020B0604020202020204" pitchFamily="34" charset="0"/>
+              <a:buChar char="•"/>
+            </a:pPr>
+            <a:endParaRPr lang="en-IN" sz="1400" dirty="0"/>
+          </a:p>
+          <a:p>
+            <a:pPr marL="285750" indent="-285750">
+              <a:lnSpc>
+                <a:spcPct val="150000"/>
+              </a:lnSpc>
+              <a:buFont typeface="Arial" panose="020B0604020202020204" pitchFamily="34" charset="0"/>
+              <a:buChar char="•"/>
+            </a:pPr>
+            <a:r>
+              <a:rPr lang="en-IN" sz="1400" dirty="0"/>
+              <a:t>Handles wide spectrum of data while being resistant to overfitting</a:t>
+            </a:r>
+          </a:p>
+        </p:txBody>
+      </p:sp>
+    </p:spTree>
+    <p:extLst>
+      <p:ext uri="{BB962C8B-B14F-4D97-AF65-F5344CB8AC3E}">
+        <p14:creationId xmlns:p14="http://schemas.microsoft.com/office/powerpoint/2010/main" val="4264341199"/>
+      </p:ext>
+    </p:extLst>
+  </p:cSld>
+  <p:clrMapOvr>
+    <a:masterClrMapping/>
+  </p:clrMapOvr>
+</p:sld>
+</file>
+
 <file path=ppt/slides/slide2.xml><?xml version="1.0" encoding="utf-8"?>
 <p:sld xmlns:a="http://schemas.openxmlformats.org/drawingml/2006/main" xmlns:r="http://schemas.openxmlformats.org/officeDocument/2006/relationships" xmlns:p="http://schemas.openxmlformats.org/presentationml/2006/main">
   <p:cSld>
+    <p:bg>
+      <p:bgPr>
+        <a:solidFill>
+          <a:schemeClr val="bg1"/>
+        </a:solidFill>
+        <a:effectLst/>
+      </p:bgPr>
+    </p:bg>
     <p:spTree>
       <p:nvGrpSpPr>
         <p:cNvPr id="1" name=""/>
@@ -13325,6 +14363,1155 @@
           <a:chExt cx="0" cy="0"/>
         </a:xfrm>
       </p:grpSpPr>
+      <p:sp useBgFill="1">
+        <p:nvSpPr>
+          <p:cNvPr id="15" name="Rectangle 14">
+            <a:extLst>
+              <a:ext uri="{FF2B5EF4-FFF2-40B4-BE49-F238E27FC236}">
+                <a16:creationId xmlns:a16="http://schemas.microsoft.com/office/drawing/2014/main" id="{85F279D6-ED25-4D3F-9479-8ABB21867D9B}"/>
+              </a:ext>
+              <a:ext uri="{C183D7F6-B498-43B3-948B-1728B52AA6E4}">
+                <adec:decorative xmlns:adec="http://schemas.microsoft.com/office/drawing/2017/decorative" val="1"/>
+              </a:ext>
+            </a:extLst>
+          </p:cNvPr>
+          <p:cNvSpPr>
+            <a:spLocks noGrp="1" noRot="1" noChangeAspect="1" noMove="1" noResize="1" noEditPoints="1" noAdjustHandles="1" noChangeArrowheads="1" noChangeShapeType="1" noTextEdit="1"/>
+          </p:cNvSpPr>
+          <p:nvPr>
+            <p:extLst>
+              <p:ext uri="{386F3935-93C4-4BCD-93E2-E3B085C9AB24}">
+                <p16:designElem xmlns:p16="http://schemas.microsoft.com/office/powerpoint/2015/main" val="1"/>
+              </p:ext>
+            </p:extLst>
+          </p:nvPr>
+        </p:nvSpPr>
+        <p:spPr>
+          <a:xfrm>
+            <a:off x="0" y="0"/>
+            <a:ext cx="12192000" cy="6858000"/>
+          </a:xfrm>
+          <a:prstGeom prst="rect">
+            <a:avLst/>
+          </a:prstGeom>
+          <a:ln>
+            <a:noFill/>
+          </a:ln>
+        </p:spPr>
+        <p:style>
+          <a:lnRef idx="2">
+            <a:schemeClr val="accent1">
+              <a:shade val="50000"/>
+            </a:schemeClr>
+          </a:lnRef>
+          <a:fillRef idx="1">
+            <a:schemeClr val="accent1"/>
+          </a:fillRef>
+          <a:effectRef idx="0">
+            <a:schemeClr val="accent1"/>
+          </a:effectRef>
+          <a:fontRef idx="minor">
+            <a:schemeClr val="lt1"/>
+          </a:fontRef>
+        </p:style>
+        <p:txBody>
+          <a:bodyPr rtlCol="0" anchor="ctr"/>
+          <a:lstStyle/>
+          <a:p>
+            <a:pPr algn="ctr"/>
+            <a:endParaRPr lang="en-US"/>
+          </a:p>
+        </p:txBody>
+      </p:sp>
+      <p:sp>
+        <p:nvSpPr>
+          <p:cNvPr id="17" name="Freeform: Shape 16">
+            <a:extLst>
+              <a:ext uri="{FF2B5EF4-FFF2-40B4-BE49-F238E27FC236}">
+                <a16:creationId xmlns:a16="http://schemas.microsoft.com/office/drawing/2014/main" id="{38D0B1B4-C487-47EF-B7D0-421066454CB6}"/>
+              </a:ext>
+              <a:ext uri="{C183D7F6-B498-43B3-948B-1728B52AA6E4}">
+                <adec:decorative xmlns:adec="http://schemas.microsoft.com/office/drawing/2017/decorative" val="1"/>
+              </a:ext>
+            </a:extLst>
+          </p:cNvPr>
+          <p:cNvSpPr>
+            <a:spLocks noGrp="1" noRot="1" noChangeAspect="1" noMove="1" noResize="1" noEditPoints="1" noAdjustHandles="1" noChangeArrowheads="1" noChangeShapeType="1" noTextEdit="1"/>
+          </p:cNvSpPr>
+          <p:nvPr>
+            <p:extLst>
+              <p:ext uri="{386F3935-93C4-4BCD-93E2-E3B085C9AB24}">
+                <p16:designElem xmlns:p16="http://schemas.microsoft.com/office/powerpoint/2015/main" val="1"/>
+              </p:ext>
+            </p:extLst>
+          </p:nvPr>
+        </p:nvSpPr>
+        <p:spPr>
+          <a:xfrm>
+            <a:off x="641275" y="643466"/>
+            <a:ext cx="1970939" cy="5571067"/>
+          </a:xfrm>
+          <a:custGeom>
+            <a:avLst/>
+            <a:gdLst>
+              <a:gd name="connsiteX0" fmla="*/ 0 w 1970939"/>
+              <a:gd name="connsiteY0" fmla="*/ 0 h 5571067"/>
+              <a:gd name="connsiteX1" fmla="*/ 1774861 w 1970939"/>
+              <a:gd name="connsiteY1" fmla="*/ 0 h 5571067"/>
+              <a:gd name="connsiteX2" fmla="*/ 1780256 w 1970939"/>
+              <a:gd name="connsiteY2" fmla="*/ 32931 h 5571067"/>
+              <a:gd name="connsiteX3" fmla="*/ 1802197 w 1970939"/>
+              <a:gd name="connsiteY3" fmla="*/ 170349 h 5571067"/>
+              <a:gd name="connsiteX4" fmla="*/ 1820981 w 1970939"/>
+              <a:gd name="connsiteY4" fmla="*/ 308372 h 5571067"/>
+              <a:gd name="connsiteX5" fmla="*/ 1839923 w 1970939"/>
+              <a:gd name="connsiteY5" fmla="*/ 445791 h 5571067"/>
+              <a:gd name="connsiteX6" fmla="*/ 1857602 w 1970939"/>
+              <a:gd name="connsiteY6" fmla="*/ 583814 h 5571067"/>
+              <a:gd name="connsiteX7" fmla="*/ 1872756 w 1970939"/>
+              <a:gd name="connsiteY7" fmla="*/ 720022 h 5571067"/>
+              <a:gd name="connsiteX8" fmla="*/ 1887120 w 1970939"/>
+              <a:gd name="connsiteY8" fmla="*/ 858046 h 5571067"/>
+              <a:gd name="connsiteX9" fmla="*/ 1900223 w 1970939"/>
+              <a:gd name="connsiteY9" fmla="*/ 995464 h 5571067"/>
+              <a:gd name="connsiteX10" fmla="*/ 1911588 w 1970939"/>
+              <a:gd name="connsiteY10" fmla="*/ 1130461 h 5571067"/>
+              <a:gd name="connsiteX11" fmla="*/ 1922953 w 1970939"/>
+              <a:gd name="connsiteY11" fmla="*/ 1267274 h 5571067"/>
+              <a:gd name="connsiteX12" fmla="*/ 1932424 w 1970939"/>
+              <a:gd name="connsiteY12" fmla="*/ 1402271 h 5571067"/>
+              <a:gd name="connsiteX13" fmla="*/ 1939842 w 1970939"/>
+              <a:gd name="connsiteY13" fmla="*/ 1537267 h 5571067"/>
+              <a:gd name="connsiteX14" fmla="*/ 1947577 w 1970939"/>
+              <a:gd name="connsiteY14" fmla="*/ 1671659 h 5571067"/>
+              <a:gd name="connsiteX15" fmla="*/ 1954049 w 1970939"/>
+              <a:gd name="connsiteY15" fmla="*/ 1804840 h 5571067"/>
+              <a:gd name="connsiteX16" fmla="*/ 1958627 w 1970939"/>
+              <a:gd name="connsiteY16" fmla="*/ 1936810 h 5571067"/>
+              <a:gd name="connsiteX17" fmla="*/ 1962573 w 1970939"/>
+              <a:gd name="connsiteY17" fmla="*/ 2068780 h 5571067"/>
+              <a:gd name="connsiteX18" fmla="*/ 1966361 w 1970939"/>
+              <a:gd name="connsiteY18" fmla="*/ 2199539 h 5571067"/>
+              <a:gd name="connsiteX19" fmla="*/ 1968098 w 1970939"/>
+              <a:gd name="connsiteY19" fmla="*/ 2328482 h 5571067"/>
+              <a:gd name="connsiteX20" fmla="*/ 1969992 w 1970939"/>
+              <a:gd name="connsiteY20" fmla="*/ 2457425 h 5571067"/>
+              <a:gd name="connsiteX21" fmla="*/ 1970939 w 1970939"/>
+              <a:gd name="connsiteY21" fmla="*/ 2584552 h 5571067"/>
+              <a:gd name="connsiteX22" fmla="*/ 1969992 w 1970939"/>
+              <a:gd name="connsiteY22" fmla="*/ 2710469 h 5571067"/>
+              <a:gd name="connsiteX23" fmla="*/ 1969992 w 1970939"/>
+              <a:gd name="connsiteY23" fmla="*/ 2835174 h 5571067"/>
+              <a:gd name="connsiteX24" fmla="*/ 1968098 w 1970939"/>
+              <a:gd name="connsiteY24" fmla="*/ 2958669 h 5571067"/>
+              <a:gd name="connsiteX25" fmla="*/ 1965256 w 1970939"/>
+              <a:gd name="connsiteY25" fmla="*/ 3079742 h 5571067"/>
+              <a:gd name="connsiteX26" fmla="*/ 1962573 w 1970939"/>
+              <a:gd name="connsiteY26" fmla="*/ 3199605 h 5571067"/>
+              <a:gd name="connsiteX27" fmla="*/ 1959574 w 1970939"/>
+              <a:gd name="connsiteY27" fmla="*/ 3317046 h 5571067"/>
+              <a:gd name="connsiteX28" fmla="*/ 1954996 w 1970939"/>
+              <a:gd name="connsiteY28" fmla="*/ 3433882 h 5571067"/>
+              <a:gd name="connsiteX29" fmla="*/ 1950103 w 1970939"/>
+              <a:gd name="connsiteY29" fmla="*/ 3548902 h 5571067"/>
+              <a:gd name="connsiteX30" fmla="*/ 1945683 w 1970939"/>
+              <a:gd name="connsiteY30" fmla="*/ 3661500 h 5571067"/>
+              <a:gd name="connsiteX31" fmla="*/ 1933213 w 1970939"/>
+              <a:gd name="connsiteY31" fmla="*/ 3881248 h 5571067"/>
+              <a:gd name="connsiteX32" fmla="*/ 1919953 w 1970939"/>
+              <a:gd name="connsiteY32" fmla="*/ 4091916 h 5571067"/>
+              <a:gd name="connsiteX33" fmla="*/ 1906063 w 1970939"/>
+              <a:gd name="connsiteY33" fmla="*/ 4294109 h 5571067"/>
+              <a:gd name="connsiteX34" fmla="*/ 1890751 w 1970939"/>
+              <a:gd name="connsiteY34" fmla="*/ 4485405 h 5571067"/>
+              <a:gd name="connsiteX35" fmla="*/ 1874809 w 1970939"/>
+              <a:gd name="connsiteY35" fmla="*/ 4668226 h 5571067"/>
+              <a:gd name="connsiteX36" fmla="*/ 1857602 w 1970939"/>
+              <a:gd name="connsiteY36" fmla="*/ 4837728 h 5571067"/>
+              <a:gd name="connsiteX37" fmla="*/ 1840713 w 1970939"/>
+              <a:gd name="connsiteY37" fmla="*/ 4996940 h 5571067"/>
+              <a:gd name="connsiteX38" fmla="*/ 1823823 w 1970939"/>
+              <a:gd name="connsiteY38" fmla="*/ 5143439 h 5571067"/>
+              <a:gd name="connsiteX39" fmla="*/ 1807880 w 1970939"/>
+              <a:gd name="connsiteY39" fmla="*/ 5277830 h 5571067"/>
+              <a:gd name="connsiteX40" fmla="*/ 1792726 w 1970939"/>
+              <a:gd name="connsiteY40" fmla="*/ 5397087 h 5571067"/>
+              <a:gd name="connsiteX41" fmla="*/ 1778362 w 1970939"/>
+              <a:gd name="connsiteY41" fmla="*/ 5504843 h 5571067"/>
+              <a:gd name="connsiteX42" fmla="*/ 1769613 w 1970939"/>
+              <a:gd name="connsiteY42" fmla="*/ 5571067 h 5571067"/>
+              <a:gd name="connsiteX43" fmla="*/ 0 w 1970939"/>
+              <a:gd name="connsiteY43" fmla="*/ 5571067 h 5571067"/>
+            </a:gdLst>
+            <a:ahLst/>
+            <a:cxnLst>
+              <a:cxn ang="0">
+                <a:pos x="connsiteX0" y="connsiteY0"/>
+              </a:cxn>
+              <a:cxn ang="0">
+                <a:pos x="connsiteX1" y="connsiteY1"/>
+              </a:cxn>
+              <a:cxn ang="0">
+                <a:pos x="connsiteX2" y="connsiteY2"/>
+              </a:cxn>
+              <a:cxn ang="0">
+                <a:pos x="connsiteX3" y="connsiteY3"/>
+              </a:cxn>
+              <a:cxn ang="0">
+                <a:pos x="connsiteX4" y="connsiteY4"/>
+              </a:cxn>
+              <a:cxn ang="0">
+                <a:pos x="connsiteX5" y="connsiteY5"/>
+              </a:cxn>
+              <a:cxn ang="0">
+                <a:pos x="connsiteX6" y="connsiteY6"/>
+              </a:cxn>
+              <a:cxn ang="0">
+                <a:pos x="connsiteX7" y="connsiteY7"/>
+              </a:cxn>
+              <a:cxn ang="0">
+                <a:pos x="connsiteX8" y="connsiteY8"/>
+              </a:cxn>
+              <a:cxn ang="0">
+                <a:pos x="connsiteX9" y="connsiteY9"/>
+              </a:cxn>
+              <a:cxn ang="0">
+                <a:pos x="connsiteX10" y="connsiteY10"/>
+              </a:cxn>
+              <a:cxn ang="0">
+                <a:pos x="connsiteX11" y="connsiteY11"/>
+              </a:cxn>
+              <a:cxn ang="0">
+                <a:pos x="connsiteX12" y="connsiteY12"/>
+              </a:cxn>
+              <a:cxn ang="0">
+                <a:pos x="connsiteX13" y="connsiteY13"/>
+              </a:cxn>
+              <a:cxn ang="0">
+                <a:pos x="connsiteX14" y="connsiteY14"/>
+              </a:cxn>
+              <a:cxn ang="0">
+                <a:pos x="connsiteX15" y="connsiteY15"/>
+              </a:cxn>
+              <a:cxn ang="0">
+                <a:pos x="connsiteX16" y="connsiteY16"/>
+              </a:cxn>
+              <a:cxn ang="0">
+                <a:pos x="connsiteX17" y="connsiteY17"/>
+              </a:cxn>
+              <a:cxn ang="0">
+                <a:pos x="connsiteX18" y="connsiteY18"/>
+              </a:cxn>
+              <a:cxn ang="0">
+                <a:pos x="connsiteX19" y="connsiteY19"/>
+              </a:cxn>
+              <a:cxn ang="0">
+                <a:pos x="connsiteX20" y="connsiteY20"/>
+              </a:cxn>
+              <a:cxn ang="0">
+                <a:pos x="connsiteX21" y="connsiteY21"/>
+              </a:cxn>
+              <a:cxn ang="0">
+                <a:pos x="connsiteX22" y="connsiteY22"/>
+              </a:cxn>
+              <a:cxn ang="0">
+                <a:pos x="connsiteX23" y="connsiteY23"/>
+              </a:cxn>
+              <a:cxn ang="0">
+                <a:pos x="connsiteX24" y="connsiteY24"/>
+              </a:cxn>
+              <a:cxn ang="0">
+                <a:pos x="connsiteX25" y="connsiteY25"/>
+              </a:cxn>
+              <a:cxn ang="0">
+                <a:pos x="connsiteX26" y="connsiteY26"/>
+              </a:cxn>
+              <a:cxn ang="0">
+                <a:pos x="connsiteX27" y="connsiteY27"/>
+              </a:cxn>
+              <a:cxn ang="0">
+                <a:pos x="connsiteX28" y="connsiteY28"/>
+              </a:cxn>
+              <a:cxn ang="0">
+                <a:pos x="connsiteX29" y="connsiteY29"/>
+              </a:cxn>
+              <a:cxn ang="0">
+                <a:pos x="connsiteX30" y="connsiteY30"/>
+              </a:cxn>
+              <a:cxn ang="0">
+                <a:pos x="connsiteX31" y="connsiteY31"/>
+              </a:cxn>
+              <a:cxn ang="0">
+                <a:pos x="connsiteX32" y="connsiteY32"/>
+              </a:cxn>
+              <a:cxn ang="0">
+                <a:pos x="connsiteX33" y="connsiteY33"/>
+              </a:cxn>
+              <a:cxn ang="0">
+                <a:pos x="connsiteX34" y="connsiteY34"/>
+              </a:cxn>
+              <a:cxn ang="0">
+                <a:pos x="connsiteX35" y="connsiteY35"/>
+              </a:cxn>
+              <a:cxn ang="0">
+                <a:pos x="connsiteX36" y="connsiteY36"/>
+              </a:cxn>
+              <a:cxn ang="0">
+                <a:pos x="connsiteX37" y="connsiteY37"/>
+              </a:cxn>
+              <a:cxn ang="0">
+                <a:pos x="connsiteX38" y="connsiteY38"/>
+              </a:cxn>
+              <a:cxn ang="0">
+                <a:pos x="connsiteX39" y="connsiteY39"/>
+              </a:cxn>
+              <a:cxn ang="0">
+                <a:pos x="connsiteX40" y="connsiteY40"/>
+              </a:cxn>
+              <a:cxn ang="0">
+                <a:pos x="connsiteX41" y="connsiteY41"/>
+              </a:cxn>
+              <a:cxn ang="0">
+                <a:pos x="connsiteX42" y="connsiteY42"/>
+              </a:cxn>
+              <a:cxn ang="0">
+                <a:pos x="connsiteX43" y="connsiteY43"/>
+              </a:cxn>
+            </a:cxnLst>
+            <a:rect l="l" t="t" r="r" b="b"/>
+            <a:pathLst>
+              <a:path w="1970939" h="5571067">
+                <a:moveTo>
+                  <a:pt x="0" y="0"/>
+                </a:moveTo>
+                <a:lnTo>
+                  <a:pt x="1774861" y="0"/>
+                </a:lnTo>
+                <a:lnTo>
+                  <a:pt x="1780256" y="32931"/>
+                </a:lnTo>
+                <a:lnTo>
+                  <a:pt x="1802197" y="170349"/>
+                </a:lnTo>
+                <a:lnTo>
+                  <a:pt x="1820981" y="308372"/>
+                </a:lnTo>
+                <a:lnTo>
+                  <a:pt x="1839923" y="445791"/>
+                </a:lnTo>
+                <a:lnTo>
+                  <a:pt x="1857602" y="583814"/>
+                </a:lnTo>
+                <a:lnTo>
+                  <a:pt x="1872756" y="720022"/>
+                </a:lnTo>
+                <a:lnTo>
+                  <a:pt x="1887120" y="858046"/>
+                </a:lnTo>
+                <a:lnTo>
+                  <a:pt x="1900223" y="995464"/>
+                </a:lnTo>
+                <a:lnTo>
+                  <a:pt x="1911588" y="1130461"/>
+                </a:lnTo>
+                <a:lnTo>
+                  <a:pt x="1922953" y="1267274"/>
+                </a:lnTo>
+                <a:lnTo>
+                  <a:pt x="1932424" y="1402271"/>
+                </a:lnTo>
+                <a:lnTo>
+                  <a:pt x="1939842" y="1537267"/>
+                </a:lnTo>
+                <a:lnTo>
+                  <a:pt x="1947577" y="1671659"/>
+                </a:lnTo>
+                <a:lnTo>
+                  <a:pt x="1954049" y="1804840"/>
+                </a:lnTo>
+                <a:lnTo>
+                  <a:pt x="1958627" y="1936810"/>
+                </a:lnTo>
+                <a:lnTo>
+                  <a:pt x="1962573" y="2068780"/>
+                </a:lnTo>
+                <a:lnTo>
+                  <a:pt x="1966361" y="2199539"/>
+                </a:lnTo>
+                <a:lnTo>
+                  <a:pt x="1968098" y="2328482"/>
+                </a:lnTo>
+                <a:lnTo>
+                  <a:pt x="1969992" y="2457425"/>
+                </a:lnTo>
+                <a:lnTo>
+                  <a:pt x="1970939" y="2584552"/>
+                </a:lnTo>
+                <a:lnTo>
+                  <a:pt x="1969992" y="2710469"/>
+                </a:lnTo>
+                <a:lnTo>
+                  <a:pt x="1969992" y="2835174"/>
+                </a:lnTo>
+                <a:lnTo>
+                  <a:pt x="1968098" y="2958669"/>
+                </a:lnTo>
+                <a:lnTo>
+                  <a:pt x="1965256" y="3079742"/>
+                </a:lnTo>
+                <a:lnTo>
+                  <a:pt x="1962573" y="3199605"/>
+                </a:lnTo>
+                <a:lnTo>
+                  <a:pt x="1959574" y="3317046"/>
+                </a:lnTo>
+                <a:lnTo>
+                  <a:pt x="1954996" y="3433882"/>
+                </a:lnTo>
+                <a:lnTo>
+                  <a:pt x="1950103" y="3548902"/>
+                </a:lnTo>
+                <a:lnTo>
+                  <a:pt x="1945683" y="3661500"/>
+                </a:lnTo>
+                <a:lnTo>
+                  <a:pt x="1933213" y="3881248"/>
+                </a:lnTo>
+                <a:lnTo>
+                  <a:pt x="1919953" y="4091916"/>
+                </a:lnTo>
+                <a:lnTo>
+                  <a:pt x="1906063" y="4294109"/>
+                </a:lnTo>
+                <a:lnTo>
+                  <a:pt x="1890751" y="4485405"/>
+                </a:lnTo>
+                <a:lnTo>
+                  <a:pt x="1874809" y="4668226"/>
+                </a:lnTo>
+                <a:lnTo>
+                  <a:pt x="1857602" y="4837728"/>
+                </a:lnTo>
+                <a:lnTo>
+                  <a:pt x="1840713" y="4996940"/>
+                </a:lnTo>
+                <a:lnTo>
+                  <a:pt x="1823823" y="5143439"/>
+                </a:lnTo>
+                <a:lnTo>
+                  <a:pt x="1807880" y="5277830"/>
+                </a:lnTo>
+                <a:lnTo>
+                  <a:pt x="1792726" y="5397087"/>
+                </a:lnTo>
+                <a:lnTo>
+                  <a:pt x="1778362" y="5504843"/>
+                </a:lnTo>
+                <a:lnTo>
+                  <a:pt x="1769613" y="5571067"/>
+                </a:lnTo>
+                <a:lnTo>
+                  <a:pt x="0" y="5571067"/>
+                </a:lnTo>
+                <a:close/>
+              </a:path>
+            </a:pathLst>
+          </a:custGeom>
+          <a:ln>
+            <a:noFill/>
+          </a:ln>
+        </p:spPr>
+        <p:style>
+          <a:lnRef idx="2">
+            <a:schemeClr val="accent1">
+              <a:shade val="50000"/>
+            </a:schemeClr>
+          </a:lnRef>
+          <a:fillRef idx="1002">
+            <a:schemeClr val="dk2"/>
+          </a:fillRef>
+          <a:effectRef idx="0">
+            <a:schemeClr val="accent1"/>
+          </a:effectRef>
+          <a:fontRef idx="minor">
+            <a:schemeClr val="lt1"/>
+          </a:fontRef>
+        </p:style>
+        <p:txBody>
+          <a:bodyPr wrap="square">
+            <a:noAutofit/>
+          </a:bodyPr>
+          <a:lstStyle/>
+          <a:p>
+            <a:endParaRPr lang="en-US" dirty="0"/>
+          </a:p>
+        </p:txBody>
+      </p:sp>
+      <p:sp>
+        <p:nvSpPr>
+          <p:cNvPr id="19" name="Freeform: Shape 18">
+            <a:extLst>
+              <a:ext uri="{FF2B5EF4-FFF2-40B4-BE49-F238E27FC236}">
+                <a16:creationId xmlns:a16="http://schemas.microsoft.com/office/drawing/2014/main" id="{0214736A-03B2-4B91-B0AF-B21213F3B9DF}"/>
+              </a:ext>
+              <a:ext uri="{C183D7F6-B498-43B3-948B-1728B52AA6E4}">
+                <adec:decorative xmlns:adec="http://schemas.microsoft.com/office/drawing/2017/decorative" val="1"/>
+              </a:ext>
+            </a:extLst>
+          </p:cNvPr>
+          <p:cNvSpPr>
+            <a:spLocks noGrp="1" noRot="1" noChangeAspect="1" noMove="1" noResize="1" noEditPoints="1" noAdjustHandles="1" noChangeArrowheads="1" noChangeShapeType="1" noTextEdit="1"/>
+          </p:cNvSpPr>
+          <p:nvPr>
+            <p:extLst>
+              <p:ext uri="{386F3935-93C4-4BCD-93E2-E3B085C9AB24}">
+                <p16:designElem xmlns:p16="http://schemas.microsoft.com/office/powerpoint/2015/main" val="1"/>
+              </p:ext>
+            </p:extLst>
+          </p:nvPr>
+        </p:nvSpPr>
+        <p:spPr bwMode="gray">
+          <a:xfrm rot="15922489">
+            <a:off x="969335" y="1702087"/>
+            <a:ext cx="3209207" cy="612850"/>
+          </a:xfrm>
+          <a:custGeom>
+            <a:avLst/>
+            <a:gdLst>
+              <a:gd name="connsiteX0" fmla="*/ 3195151 w 3209207"/>
+              <a:gd name="connsiteY0" fmla="*/ 612847 h 612850"/>
+              <a:gd name="connsiteX1" fmla="*/ 3029871 w 3209207"/>
+              <a:gd name="connsiteY1" fmla="*/ 611146 h 612850"/>
+              <a:gd name="connsiteX2" fmla="*/ 2949639 w 3209207"/>
+              <a:gd name="connsiteY2" fmla="*/ 608906 h 612850"/>
+              <a:gd name="connsiteX3" fmla="*/ 2978018 w 3209207"/>
+              <a:gd name="connsiteY3" fmla="*/ 258115 h 612850"/>
+              <a:gd name="connsiteX4" fmla="*/ 2944764 w 3209207"/>
+              <a:gd name="connsiteY4" fmla="*/ 260801 h 612850"/>
+              <a:gd name="connsiteX5" fmla="*/ 2806036 w 3209207"/>
+              <a:gd name="connsiteY5" fmla="*/ 271446 h 612850"/>
+              <a:gd name="connsiteX6" fmla="*/ 2666958 w 3209207"/>
+              <a:gd name="connsiteY6" fmla="*/ 278917 h 612850"/>
+              <a:gd name="connsiteX7" fmla="*/ 2528469 w 3209207"/>
+              <a:gd name="connsiteY7" fmla="*/ 286593 h 612850"/>
+              <a:gd name="connsiteX8" fmla="*/ 2389479 w 3209207"/>
+              <a:gd name="connsiteY8" fmla="*/ 292970 h 612850"/>
+              <a:gd name="connsiteX9" fmla="*/ 2252501 w 3209207"/>
+              <a:gd name="connsiteY9" fmla="*/ 296993 h 612850"/>
+              <a:gd name="connsiteX10" fmla="*/ 2113775 w 3209207"/>
+              <a:gd name="connsiteY10" fmla="*/ 300086 h 612850"/>
+              <a:gd name="connsiteX11" fmla="*/ 1975755 w 3209207"/>
+              <a:gd name="connsiteY11" fmla="*/ 301980 h 612850"/>
+              <a:gd name="connsiteX12" fmla="*/ 1840287 w 3209207"/>
+              <a:gd name="connsiteY12" fmla="*/ 302348 h 612850"/>
+              <a:gd name="connsiteX13" fmla="*/ 1703009 w 3209207"/>
+              <a:gd name="connsiteY13" fmla="*/ 302570 h 612850"/>
+              <a:gd name="connsiteX14" fmla="*/ 1567693 w 3209207"/>
+              <a:gd name="connsiteY14" fmla="*/ 301063 h 612850"/>
+              <a:gd name="connsiteX15" fmla="*/ 1432543 w 3209207"/>
+              <a:gd name="connsiteY15" fmla="*/ 297523 h 612850"/>
+              <a:gd name="connsiteX16" fmla="*/ 1297969 w 3209207"/>
+              <a:gd name="connsiteY16" fmla="*/ 294345 h 612850"/>
+              <a:gd name="connsiteX17" fmla="*/ 1164703 w 3209207"/>
+              <a:gd name="connsiteY17" fmla="*/ 290015 h 612850"/>
+              <a:gd name="connsiteX18" fmla="*/ 1032796 w 3209207"/>
+              <a:gd name="connsiteY18" fmla="*/ 283907 h 612850"/>
+              <a:gd name="connsiteX19" fmla="*/ 900940 w 3209207"/>
+              <a:gd name="connsiteY19" fmla="*/ 277172 h 612850"/>
+              <a:gd name="connsiteX20" fmla="*/ 770303 w 3209207"/>
+              <a:gd name="connsiteY20" fmla="*/ 270380 h 612850"/>
+              <a:gd name="connsiteX21" fmla="*/ 641641 w 3209207"/>
+              <a:gd name="connsiteY21" fmla="*/ 261702 h 612850"/>
+              <a:gd name="connsiteX22" fmla="*/ 512966 w 3209207"/>
+              <a:gd name="connsiteY22" fmla="*/ 253180 h 612850"/>
+              <a:gd name="connsiteX23" fmla="*/ 386177 w 3209207"/>
+              <a:gd name="connsiteY23" fmla="*/ 243867 h 612850"/>
+              <a:gd name="connsiteX24" fmla="*/ 260746 w 3209207"/>
+              <a:gd name="connsiteY24" fmla="*/ 232775 h 612850"/>
+              <a:gd name="connsiteX25" fmla="*/ 136447 w 3209207"/>
+              <a:gd name="connsiteY25" fmla="*/ 222719 h 612850"/>
+              <a:gd name="connsiteX26" fmla="*/ 13506 w 3209207"/>
+              <a:gd name="connsiteY26" fmla="*/ 210885 h 612850"/>
+              <a:gd name="connsiteX27" fmla="*/ 0 w 3209207"/>
+              <a:gd name="connsiteY27" fmla="*/ 209475 h 612850"/>
+              <a:gd name="connsiteX28" fmla="*/ 40844 w 3209207"/>
+              <a:gd name="connsiteY28" fmla="*/ 212313 h 612850"/>
+              <a:gd name="connsiteX29" fmla="*/ 132211 w 3209207"/>
+              <a:gd name="connsiteY29" fmla="*/ 216946 h 612850"/>
+              <a:gd name="connsiteX30" fmla="*/ 225585 w 3209207"/>
+              <a:gd name="connsiteY30" fmla="*/ 221811 h 612850"/>
+              <a:gd name="connsiteX31" fmla="*/ 320298 w 3209207"/>
+              <a:gd name="connsiteY31" fmla="*/ 226444 h 612850"/>
+              <a:gd name="connsiteX32" fmla="*/ 415680 w 3209207"/>
+              <a:gd name="connsiteY32" fmla="*/ 229340 h 612850"/>
+              <a:gd name="connsiteX33" fmla="*/ 512735 w 3209207"/>
+              <a:gd name="connsiteY33" fmla="*/ 232120 h 612850"/>
+              <a:gd name="connsiteX34" fmla="*/ 611464 w 3209207"/>
+              <a:gd name="connsiteY34" fmla="*/ 235015 h 612850"/>
+              <a:gd name="connsiteX35" fmla="*/ 711532 w 3209207"/>
+              <a:gd name="connsiteY35" fmla="*/ 236985 h 612850"/>
+              <a:gd name="connsiteX36" fmla="*/ 812604 w 3209207"/>
+              <a:gd name="connsiteY36" fmla="*/ 236985 h 612850"/>
+              <a:gd name="connsiteX37" fmla="*/ 915014 w 3209207"/>
+              <a:gd name="connsiteY37" fmla="*/ 237795 h 612850"/>
+              <a:gd name="connsiteX38" fmla="*/ 1018428 w 3209207"/>
+              <a:gd name="connsiteY38" fmla="*/ 236985 h 612850"/>
+              <a:gd name="connsiteX39" fmla="*/ 1122847 w 3209207"/>
+              <a:gd name="connsiteY39" fmla="*/ 235015 h 612850"/>
+              <a:gd name="connsiteX40" fmla="*/ 1227600 w 3209207"/>
+              <a:gd name="connsiteY40" fmla="*/ 233162 h 612850"/>
+              <a:gd name="connsiteX41" fmla="*/ 1333692 w 3209207"/>
+              <a:gd name="connsiteY41" fmla="*/ 229340 h 612850"/>
+              <a:gd name="connsiteX42" fmla="*/ 1441122 w 3209207"/>
+              <a:gd name="connsiteY42" fmla="*/ 225634 h 612850"/>
+              <a:gd name="connsiteX43" fmla="*/ 1547883 w 3209207"/>
+              <a:gd name="connsiteY43" fmla="*/ 220769 h 612850"/>
+              <a:gd name="connsiteX44" fmla="*/ 1655983 w 3209207"/>
+              <a:gd name="connsiteY44" fmla="*/ 214282 h 612850"/>
+              <a:gd name="connsiteX45" fmla="*/ 1765421 w 3209207"/>
+              <a:gd name="connsiteY45" fmla="*/ 206638 h 612850"/>
+              <a:gd name="connsiteX46" fmla="*/ 1874860 w 3209207"/>
+              <a:gd name="connsiteY46" fmla="*/ 199108 h 612850"/>
+              <a:gd name="connsiteX47" fmla="*/ 1984299 w 3209207"/>
+              <a:gd name="connsiteY47" fmla="*/ 189495 h 612850"/>
+              <a:gd name="connsiteX48" fmla="*/ 2095745 w 3209207"/>
+              <a:gd name="connsiteY48" fmla="*/ 178144 h 612850"/>
+              <a:gd name="connsiteX49" fmla="*/ 2205184 w 3209207"/>
+              <a:gd name="connsiteY49" fmla="*/ 166793 h 612850"/>
+              <a:gd name="connsiteX50" fmla="*/ 2316631 w 3209207"/>
+              <a:gd name="connsiteY50" fmla="*/ 153472 h 612850"/>
+              <a:gd name="connsiteX51" fmla="*/ 2429081 w 3209207"/>
+              <a:gd name="connsiteY51" fmla="*/ 139226 h 612850"/>
+              <a:gd name="connsiteX52" fmla="*/ 2539523 w 3209207"/>
+              <a:gd name="connsiteY52" fmla="*/ 124052 h 612850"/>
+              <a:gd name="connsiteX53" fmla="*/ 2651305 w 3209207"/>
+              <a:gd name="connsiteY53" fmla="*/ 106215 h 612850"/>
+              <a:gd name="connsiteX54" fmla="*/ 2763086 w 3209207"/>
+              <a:gd name="connsiteY54" fmla="*/ 87219 h 612850"/>
+              <a:gd name="connsiteX55" fmla="*/ 2874867 w 3209207"/>
+              <a:gd name="connsiteY55" fmla="*/ 68339 h 612850"/>
+              <a:gd name="connsiteX56" fmla="*/ 2986314 w 3209207"/>
+              <a:gd name="connsiteY56" fmla="*/ 46331 h 612850"/>
+              <a:gd name="connsiteX57" fmla="*/ 3097760 w 3209207"/>
+              <a:gd name="connsiteY57" fmla="*/ 23629 h 612850"/>
+              <a:gd name="connsiteX58" fmla="*/ 3209207 w 3209207"/>
+              <a:gd name="connsiteY58" fmla="*/ 0 h 612850"/>
+              <a:gd name="connsiteX59" fmla="*/ 3195151 w 3209207"/>
+              <a:gd name="connsiteY59" fmla="*/ 612847 h 612850"/>
+            </a:gdLst>
+            <a:ahLst/>
+            <a:cxnLst>
+              <a:cxn ang="0">
+                <a:pos x="connsiteX0" y="connsiteY0"/>
+              </a:cxn>
+              <a:cxn ang="0">
+                <a:pos x="connsiteX1" y="connsiteY1"/>
+              </a:cxn>
+              <a:cxn ang="0">
+                <a:pos x="connsiteX2" y="connsiteY2"/>
+              </a:cxn>
+              <a:cxn ang="0">
+                <a:pos x="connsiteX3" y="connsiteY3"/>
+              </a:cxn>
+              <a:cxn ang="0">
+                <a:pos x="connsiteX4" y="connsiteY4"/>
+              </a:cxn>
+              <a:cxn ang="0">
+                <a:pos x="connsiteX5" y="connsiteY5"/>
+              </a:cxn>
+              <a:cxn ang="0">
+                <a:pos x="connsiteX6" y="connsiteY6"/>
+              </a:cxn>
+              <a:cxn ang="0">
+                <a:pos x="connsiteX7" y="connsiteY7"/>
+              </a:cxn>
+              <a:cxn ang="0">
+                <a:pos x="connsiteX8" y="connsiteY8"/>
+              </a:cxn>
+              <a:cxn ang="0">
+                <a:pos x="connsiteX9" y="connsiteY9"/>
+              </a:cxn>
+              <a:cxn ang="0">
+                <a:pos x="connsiteX10" y="connsiteY10"/>
+              </a:cxn>
+              <a:cxn ang="0">
+                <a:pos x="connsiteX11" y="connsiteY11"/>
+              </a:cxn>
+              <a:cxn ang="0">
+                <a:pos x="connsiteX12" y="connsiteY12"/>
+              </a:cxn>
+              <a:cxn ang="0">
+                <a:pos x="connsiteX13" y="connsiteY13"/>
+              </a:cxn>
+              <a:cxn ang="0">
+                <a:pos x="connsiteX14" y="connsiteY14"/>
+              </a:cxn>
+              <a:cxn ang="0">
+                <a:pos x="connsiteX15" y="connsiteY15"/>
+              </a:cxn>
+              <a:cxn ang="0">
+                <a:pos x="connsiteX16" y="connsiteY16"/>
+              </a:cxn>
+              <a:cxn ang="0">
+                <a:pos x="connsiteX17" y="connsiteY17"/>
+              </a:cxn>
+              <a:cxn ang="0">
+                <a:pos x="connsiteX18" y="connsiteY18"/>
+              </a:cxn>
+              <a:cxn ang="0">
+                <a:pos x="connsiteX19" y="connsiteY19"/>
+              </a:cxn>
+              <a:cxn ang="0">
+                <a:pos x="connsiteX20" y="connsiteY20"/>
+              </a:cxn>
+              <a:cxn ang="0">
+                <a:pos x="connsiteX21" y="connsiteY21"/>
+              </a:cxn>
+              <a:cxn ang="0">
+                <a:pos x="connsiteX22" y="connsiteY22"/>
+              </a:cxn>
+              <a:cxn ang="0">
+                <a:pos x="connsiteX23" y="connsiteY23"/>
+              </a:cxn>
+              <a:cxn ang="0">
+                <a:pos x="connsiteX24" y="connsiteY24"/>
+              </a:cxn>
+              <a:cxn ang="0">
+                <a:pos x="connsiteX25" y="connsiteY25"/>
+              </a:cxn>
+              <a:cxn ang="0">
+                <a:pos x="connsiteX26" y="connsiteY26"/>
+              </a:cxn>
+              <a:cxn ang="0">
+                <a:pos x="connsiteX27" y="connsiteY27"/>
+              </a:cxn>
+              <a:cxn ang="0">
+                <a:pos x="connsiteX28" y="connsiteY28"/>
+              </a:cxn>
+              <a:cxn ang="0">
+                <a:pos x="connsiteX29" y="connsiteY29"/>
+              </a:cxn>
+              <a:cxn ang="0">
+                <a:pos x="connsiteX30" y="connsiteY30"/>
+              </a:cxn>
+              <a:cxn ang="0">
+                <a:pos x="connsiteX31" y="connsiteY31"/>
+              </a:cxn>
+              <a:cxn ang="0">
+                <a:pos x="connsiteX32" y="connsiteY32"/>
+              </a:cxn>
+              <a:cxn ang="0">
+                <a:pos x="connsiteX33" y="connsiteY33"/>
+              </a:cxn>
+              <a:cxn ang="0">
+                <a:pos x="connsiteX34" y="connsiteY34"/>
+              </a:cxn>
+              <a:cxn ang="0">
+                <a:pos x="connsiteX35" y="connsiteY35"/>
+              </a:cxn>
+              <a:cxn ang="0">
+                <a:pos x="connsiteX36" y="connsiteY36"/>
+              </a:cxn>
+              <a:cxn ang="0">
+                <a:pos x="connsiteX37" y="connsiteY37"/>
+              </a:cxn>
+              <a:cxn ang="0">
+                <a:pos x="connsiteX38" y="connsiteY38"/>
+              </a:cxn>
+              <a:cxn ang="0">
+                <a:pos x="connsiteX39" y="connsiteY39"/>
+              </a:cxn>
+              <a:cxn ang="0">
+                <a:pos x="connsiteX40" y="connsiteY40"/>
+              </a:cxn>
+              <a:cxn ang="0">
+                <a:pos x="connsiteX41" y="connsiteY41"/>
+              </a:cxn>
+              <a:cxn ang="0">
+                <a:pos x="connsiteX42" y="connsiteY42"/>
+              </a:cxn>
+              <a:cxn ang="0">
+                <a:pos x="connsiteX43" y="connsiteY43"/>
+              </a:cxn>
+              <a:cxn ang="0">
+                <a:pos x="connsiteX44" y="connsiteY44"/>
+              </a:cxn>
+              <a:cxn ang="0">
+                <a:pos x="connsiteX45" y="connsiteY45"/>
+              </a:cxn>
+              <a:cxn ang="0">
+                <a:pos x="connsiteX46" y="connsiteY46"/>
+              </a:cxn>
+              <a:cxn ang="0">
+                <a:pos x="connsiteX47" y="connsiteY47"/>
+              </a:cxn>
+              <a:cxn ang="0">
+                <a:pos x="connsiteX48" y="connsiteY48"/>
+              </a:cxn>
+              <a:cxn ang="0">
+                <a:pos x="connsiteX49" y="connsiteY49"/>
+              </a:cxn>
+              <a:cxn ang="0">
+                <a:pos x="connsiteX50" y="connsiteY50"/>
+              </a:cxn>
+              <a:cxn ang="0">
+                <a:pos x="connsiteX51" y="connsiteY51"/>
+              </a:cxn>
+              <a:cxn ang="0">
+                <a:pos x="connsiteX52" y="connsiteY52"/>
+              </a:cxn>
+              <a:cxn ang="0">
+                <a:pos x="connsiteX53" y="connsiteY53"/>
+              </a:cxn>
+              <a:cxn ang="0">
+                <a:pos x="connsiteX54" y="connsiteY54"/>
+              </a:cxn>
+              <a:cxn ang="0">
+                <a:pos x="connsiteX55" y="connsiteY55"/>
+              </a:cxn>
+              <a:cxn ang="0">
+                <a:pos x="connsiteX56" y="connsiteY56"/>
+              </a:cxn>
+              <a:cxn ang="0">
+                <a:pos x="connsiteX57" y="connsiteY57"/>
+              </a:cxn>
+              <a:cxn ang="0">
+                <a:pos x="connsiteX58" y="connsiteY58"/>
+              </a:cxn>
+              <a:cxn ang="0">
+                <a:pos x="connsiteX59" y="connsiteY59"/>
+              </a:cxn>
+            </a:cxnLst>
+            <a:rect l="l" t="t" r="r" b="b"/>
+            <a:pathLst>
+              <a:path w="3209207" h="612850">
+                <a:moveTo>
+                  <a:pt x="3195151" y="612847"/>
+                </a:moveTo>
+                <a:cubicBezTo>
+                  <a:pt x="3144238" y="612898"/>
+                  <a:pt x="3088941" y="612318"/>
+                  <a:pt x="3029871" y="611146"/>
+                </a:cubicBezTo>
+                <a:lnTo>
+                  <a:pt x="2949639" y="608906"/>
+                </a:lnTo>
+                <a:lnTo>
+                  <a:pt x="2978018" y="258115"/>
+                </a:lnTo>
+                <a:lnTo>
+                  <a:pt x="2944764" y="260801"/>
+                </a:lnTo>
+                <a:lnTo>
+                  <a:pt x="2806036" y="271446"/>
+                </a:lnTo>
+                <a:lnTo>
+                  <a:pt x="2666958" y="278917"/>
+                </a:lnTo>
+                <a:lnTo>
+                  <a:pt x="2528469" y="286593"/>
+                </a:lnTo>
+                <a:lnTo>
+                  <a:pt x="2389479" y="292970"/>
+                </a:lnTo>
+                <a:lnTo>
+                  <a:pt x="2252501" y="296993"/>
+                </a:lnTo>
+                <a:lnTo>
+                  <a:pt x="2113775" y="300086"/>
+                </a:lnTo>
+                <a:lnTo>
+                  <a:pt x="1975755" y="301980"/>
+                </a:lnTo>
+                <a:lnTo>
+                  <a:pt x="1840287" y="302348"/>
+                </a:lnTo>
+                <a:lnTo>
+                  <a:pt x="1703009" y="302570"/>
+                </a:lnTo>
+                <a:lnTo>
+                  <a:pt x="1567693" y="301063"/>
+                </a:lnTo>
+                <a:lnTo>
+                  <a:pt x="1432543" y="297523"/>
+                </a:lnTo>
+                <a:lnTo>
+                  <a:pt x="1297969" y="294345"/>
+                </a:lnTo>
+                <a:lnTo>
+                  <a:pt x="1164703" y="290015"/>
+                </a:lnTo>
+                <a:lnTo>
+                  <a:pt x="1032796" y="283907"/>
+                </a:lnTo>
+                <a:lnTo>
+                  <a:pt x="900940" y="277172"/>
+                </a:lnTo>
+                <a:lnTo>
+                  <a:pt x="770303" y="270380"/>
+                </a:lnTo>
+                <a:lnTo>
+                  <a:pt x="641641" y="261702"/>
+                </a:lnTo>
+                <a:lnTo>
+                  <a:pt x="512966" y="253180"/>
+                </a:lnTo>
+                <a:lnTo>
+                  <a:pt x="386177" y="243867"/>
+                </a:lnTo>
+                <a:lnTo>
+                  <a:pt x="260746" y="232775"/>
+                </a:lnTo>
+                <a:lnTo>
+                  <a:pt x="136447" y="222719"/>
+                </a:lnTo>
+                <a:lnTo>
+                  <a:pt x="13506" y="210885"/>
+                </a:lnTo>
+                <a:lnTo>
+                  <a:pt x="0" y="209475"/>
+                </a:lnTo>
+                <a:lnTo>
+                  <a:pt x="40844" y="212313"/>
+                </a:lnTo>
+                <a:lnTo>
+                  <a:pt x="132211" y="216946"/>
+                </a:lnTo>
+                <a:lnTo>
+                  <a:pt x="225585" y="221811"/>
+                </a:lnTo>
+                <a:lnTo>
+                  <a:pt x="320298" y="226444"/>
+                </a:lnTo>
+                <a:lnTo>
+                  <a:pt x="415680" y="229340"/>
+                </a:lnTo>
+                <a:lnTo>
+                  <a:pt x="512735" y="232120"/>
+                </a:lnTo>
+                <a:lnTo>
+                  <a:pt x="611464" y="235015"/>
+                </a:lnTo>
+                <a:lnTo>
+                  <a:pt x="711532" y="236985"/>
+                </a:lnTo>
+                <a:lnTo>
+                  <a:pt x="812604" y="236985"/>
+                </a:lnTo>
+                <a:lnTo>
+                  <a:pt x="915014" y="237795"/>
+                </a:lnTo>
+                <a:lnTo>
+                  <a:pt x="1018428" y="236985"/>
+                </a:lnTo>
+                <a:lnTo>
+                  <a:pt x="1122847" y="235015"/>
+                </a:lnTo>
+                <a:lnTo>
+                  <a:pt x="1227600" y="233162"/>
+                </a:lnTo>
+                <a:lnTo>
+                  <a:pt x="1333692" y="229340"/>
+                </a:lnTo>
+                <a:lnTo>
+                  <a:pt x="1441122" y="225634"/>
+                </a:lnTo>
+                <a:lnTo>
+                  <a:pt x="1547883" y="220769"/>
+                </a:lnTo>
+                <a:lnTo>
+                  <a:pt x="1655983" y="214282"/>
+                </a:lnTo>
+                <a:lnTo>
+                  <a:pt x="1765421" y="206638"/>
+                </a:lnTo>
+                <a:lnTo>
+                  <a:pt x="1874860" y="199108"/>
+                </a:lnTo>
+                <a:lnTo>
+                  <a:pt x="1984299" y="189495"/>
+                </a:lnTo>
+                <a:lnTo>
+                  <a:pt x="2095745" y="178144"/>
+                </a:lnTo>
+                <a:lnTo>
+                  <a:pt x="2205184" y="166793"/>
+                </a:lnTo>
+                <a:lnTo>
+                  <a:pt x="2316631" y="153472"/>
+                </a:lnTo>
+                <a:lnTo>
+                  <a:pt x="2429081" y="139226"/>
+                </a:lnTo>
+                <a:lnTo>
+                  <a:pt x="2539523" y="124052"/>
+                </a:lnTo>
+                <a:lnTo>
+                  <a:pt x="2651305" y="106215"/>
+                </a:lnTo>
+                <a:lnTo>
+                  <a:pt x="2763086" y="87219"/>
+                </a:lnTo>
+                <a:lnTo>
+                  <a:pt x="2874867" y="68339"/>
+                </a:lnTo>
+                <a:lnTo>
+                  <a:pt x="2986314" y="46331"/>
+                </a:lnTo>
+                <a:lnTo>
+                  <a:pt x="3097760" y="23629"/>
+                </a:lnTo>
+                <a:lnTo>
+                  <a:pt x="3209207" y="0"/>
+                </a:lnTo>
+                <a:cubicBezTo>
+                  <a:pt x="3198832" y="386055"/>
+                  <a:pt x="3205525" y="226792"/>
+                  <a:pt x="3195151" y="612847"/>
+                </a:cubicBezTo>
+                <a:close/>
+              </a:path>
+            </a:pathLst>
+          </a:custGeom>
+          <a:solidFill>
+            <a:schemeClr val="bg1">
+              <a:alpha val="20000"/>
+            </a:schemeClr>
+          </a:solidFill>
+          <a:ln>
+            <a:noFill/>
+          </a:ln>
+        </p:spPr>
+        <p:txBody>
+          <a:bodyPr wrap="square">
+            <a:noAutofit/>
+          </a:bodyPr>
+          <a:lstStyle/>
+          <a:p>
+            <a:endParaRPr lang="en-US" dirty="0"/>
+          </a:p>
+        </p:txBody>
+      </p:sp>
+      <p:pic>
+        <p:nvPicPr>
+          <p:cNvPr id="9" name="Picture 8" descr="A graph with a line and dots&#10;&#10;AI-generated content may be incorrect.">
+            <a:extLst>
+              <a:ext uri="{FF2B5EF4-FFF2-40B4-BE49-F238E27FC236}">
+                <a16:creationId xmlns:a16="http://schemas.microsoft.com/office/drawing/2014/main" id="{9E7AF7DB-A8D7-C274-B210-254C596A8B36}"/>
+              </a:ext>
+            </a:extLst>
+          </p:cNvPr>
+          <p:cNvPicPr>
+            <a:picLocks noChangeAspect="1"/>
+          </p:cNvPicPr>
+          <p:nvPr/>
+        </p:nvPicPr>
+        <p:blipFill>
+          <a:blip r:embed="rId2">
+            <a:extLst>
+              <a:ext uri="{28A0092B-C50C-407E-A947-70E740481C1C}">
+                <a14:useLocalDpi xmlns:a14="http://schemas.microsoft.com/office/drawing/2010/main" val="0"/>
+              </a:ext>
+              <a:ext uri="{837473B0-CC2E-450A-ABE3-18F120FF3D39}">
+                <a1611:picAttrSrcUrl xmlns:a1611="http://schemas.microsoft.com/office/drawing/2016/11/main" r:id="rId3"/>
+              </a:ext>
+            </a:extLst>
+          </a:blip>
+          <a:stretch>
+            <a:fillRect/>
+          </a:stretch>
+        </p:blipFill>
+        <p:spPr>
+          <a:xfrm>
+            <a:off x="3378899" y="643466"/>
+            <a:ext cx="7799494" cy="5571067"/>
+          </a:xfrm>
+          <a:prstGeom prst="rect">
+            <a:avLst/>
+          </a:prstGeom>
+        </p:spPr>
+      </p:pic>
+      <p:sp>
+        <p:nvSpPr>
+          <p:cNvPr id="10" name="TextBox 9">
+            <a:extLst>
+              <a:ext uri="{FF2B5EF4-FFF2-40B4-BE49-F238E27FC236}">
+                <a16:creationId xmlns:a16="http://schemas.microsoft.com/office/drawing/2014/main" id="{218B823B-D2FE-F5A4-E833-425A89991997}"/>
+              </a:ext>
+            </a:extLst>
+          </p:cNvPr>
+          <p:cNvSpPr txBox="1"/>
+          <p:nvPr/>
+        </p:nvSpPr>
+        <p:spPr>
+          <a:xfrm>
+            <a:off x="8638916" y="6014478"/>
+            <a:ext cx="2539477" cy="200055"/>
+          </a:xfrm>
+          <a:prstGeom prst="rect">
+            <a:avLst/>
+          </a:prstGeom>
+          <a:solidFill>
+            <a:srgbClr val="000000"/>
+          </a:solidFill>
+        </p:spPr>
+        <p:txBody>
+          <a:bodyPr wrap="none" rtlCol="0">
+            <a:spAutoFit/>
+          </a:bodyPr>
+          <a:lstStyle/>
+          <a:p>
+            <a:pPr algn="r">
+              <a:spcAft>
+                <a:spcPts val="600"/>
+              </a:spcAft>
+            </a:pPr>
+            <a:r>
+              <a:rPr lang="en-DE" sz="700">
+                <a:solidFill>
+                  <a:srgbClr val="FFFFFF"/>
+                </a:solidFill>
+                <a:hlinkClick r:id="rId3" tooltip="https://vgherard.github.io/posts/2023-05-20-linear-regression-with-autocorrelated-noise/index.html">
+                  <a:extLst>
+                    <a:ext uri="{A12FA001-AC4F-418D-AE19-62706E023703}">
+                      <ahyp:hlinkClr xmlns:ahyp="http://schemas.microsoft.com/office/drawing/2018/hyperlinkcolor" val="tx"/>
+                    </a:ext>
+                  </a:extLst>
+                </a:hlinkClick>
+              </a:rPr>
+              <a:t>This Photo</a:t>
+            </a:r>
+            <a:r>
+              <a:rPr lang="en-DE" sz="700">
+                <a:solidFill>
+                  <a:srgbClr val="FFFFFF"/>
+                </a:solidFill>
+              </a:rPr>
+              <a:t> by Unknown Author is licensed under </a:t>
+            </a:r>
+            <a:r>
+              <a:rPr lang="en-DE" sz="700">
+                <a:solidFill>
+                  <a:srgbClr val="FFFFFF"/>
+                </a:solidFill>
+                <a:hlinkClick r:id="rId4" tooltip="https://creativecommons.org/licenses/by/3.0/">
+                  <a:extLst>
+                    <a:ext uri="{A12FA001-AC4F-418D-AE19-62706E023703}">
+                      <ahyp:hlinkClr xmlns:ahyp="http://schemas.microsoft.com/office/drawing/2018/hyperlinkcolor" val="tx"/>
+                    </a:ext>
+                  </a:extLst>
+                </a:hlinkClick>
+              </a:rPr>
+              <a:t>CC BY</a:t>
+            </a:r>
+            <a:endParaRPr lang="en-DE" sz="700">
+              <a:solidFill>
+                <a:srgbClr val="FFFFFF"/>
+              </a:solidFill>
+            </a:endParaRPr>
+          </a:p>
+        </p:txBody>
+      </p:sp>
     </p:spTree>
     <p:extLst>
       <p:ext uri="{BB962C8B-B14F-4D97-AF65-F5344CB8AC3E}">
@@ -14552,6 +16739,71 @@
 </p:sld>
 </file>
 
+<file path=ppt/slides/slide9.xml><?xml version="1.0" encoding="utf-8"?>
+<p:sld xmlns:a="http://schemas.openxmlformats.org/drawingml/2006/main" xmlns:r="http://schemas.openxmlformats.org/officeDocument/2006/relationships" xmlns:p="http://schemas.openxmlformats.org/presentationml/2006/main">
+  <p:cSld>
+    <p:spTree>
+      <p:nvGrpSpPr>
+        <p:cNvPr id="1" name="">
+          <a:extLst>
+            <a:ext uri="{FF2B5EF4-FFF2-40B4-BE49-F238E27FC236}">
+              <a16:creationId xmlns:a16="http://schemas.microsoft.com/office/drawing/2014/main" id="{9CFD847B-513A-7B55-365F-2C2DD4DEBBD5}"/>
+            </a:ext>
+          </a:extLst>
+        </p:cNvPr>
+        <p:cNvGrpSpPr/>
+        <p:nvPr/>
+      </p:nvGrpSpPr>
+      <p:grpSpPr>
+        <a:xfrm>
+          <a:off x="0" y="0"/>
+          <a:ext cx="0" cy="0"/>
+          <a:chOff x="0" y="0"/>
+          <a:chExt cx="0" cy="0"/>
+        </a:xfrm>
+      </p:grpSpPr>
+      <p:sp>
+        <p:nvSpPr>
+          <p:cNvPr id="2" name="Title 1">
+            <a:extLst>
+              <a:ext uri="{FF2B5EF4-FFF2-40B4-BE49-F238E27FC236}">
+                <a16:creationId xmlns:a16="http://schemas.microsoft.com/office/drawing/2014/main" id="{0430CDF2-6388-D930-7FEE-8501807EEE97}"/>
+              </a:ext>
+            </a:extLst>
+          </p:cNvPr>
+          <p:cNvSpPr>
+            <a:spLocks noGrp="1"/>
+          </p:cNvSpPr>
+          <p:nvPr>
+            <p:ph type="ctrTitle"/>
+          </p:nvPr>
+        </p:nvSpPr>
+        <p:spPr/>
+        <p:txBody>
+          <a:bodyPr/>
+          <a:lstStyle/>
+          <a:p>
+            <a:r>
+              <a:rPr lang="en-IN" dirty="0"/>
+              <a:t>Applications</a:t>
+            </a:r>
+            <a:endParaRPr lang="en-DE" dirty="0"/>
+          </a:p>
+        </p:txBody>
+      </p:sp>
+    </p:spTree>
+    <p:extLst>
+      <p:ext uri="{BB962C8B-B14F-4D97-AF65-F5344CB8AC3E}">
+        <p14:creationId xmlns:p14="http://schemas.microsoft.com/office/powerpoint/2010/main" val="1623246099"/>
+      </p:ext>
+    </p:extLst>
+  </p:cSld>
+  <p:clrMapOvr>
+    <a:masterClrMapping/>
+  </p:clrMapOvr>
+</p:sld>
+</file>
+
 <file path=ppt/theme/theme1.xml><?xml version="1.0" encoding="utf-8"?>
 <a:theme xmlns:a="http://schemas.openxmlformats.org/drawingml/2006/main" name="Ion Boardroom">
   <a:themeElements>

</xml_diff>